<commit_message>
Added lecture 9 full
</commit_message>
<xml_diff>
--- a/sql/lectures/9_functional_dependencies.pptx
+++ b/sql/lectures/9_functional_dependencies.pptx
@@ -5,7 +5,7 @@
     <p:sldMasterId id="2147483668" r:id="rId1"/>
   </p:sldMasterIdLst>
   <p:notesMasterIdLst>
-    <p:notesMasterId r:id="rId10"/>
+    <p:notesMasterId r:id="rId22"/>
   </p:notesMasterIdLst>
   <p:sldIdLst>
     <p:sldId id="256" r:id="rId2"/>
@@ -16,6 +16,18 @@
     <p:sldId id="261" r:id="rId7"/>
     <p:sldId id="263" r:id="rId8"/>
     <p:sldId id="264" r:id="rId9"/>
+    <p:sldId id="265" r:id="rId10"/>
+    <p:sldId id="266" r:id="rId11"/>
+    <p:sldId id="267" r:id="rId12"/>
+    <p:sldId id="268" r:id="rId13"/>
+    <p:sldId id="269" r:id="rId14"/>
+    <p:sldId id="270" r:id="rId15"/>
+    <p:sldId id="271" r:id="rId16"/>
+    <p:sldId id="272" r:id="rId17"/>
+    <p:sldId id="273" r:id="rId18"/>
+    <p:sldId id="274" r:id="rId19"/>
+    <p:sldId id="275" r:id="rId20"/>
+    <p:sldId id="276" r:id="rId21"/>
   </p:sldIdLst>
   <p:sldSz cx="9144000" cy="6858000" type="screen4x3"/>
   <p:notesSz cx="6858000" cy="9144000"/>
@@ -116,7 +128,7 @@
   </p:defaultTextStyle>
   <p:extLst>
     <p:ext uri="{EFAFB233-063F-42B5-8137-9DF3F51BA10A}">
-      <p15:sldGuideLst xmlns:p15="http://schemas.microsoft.com/office/powerpoint/2012/main">
+      <p15:sldGuideLst xmlns:p15="http://schemas.microsoft.com/office/powerpoint/2012/main" xmlns="">
         <p15:guide id="1" orient="horz" pos="2160">
           <p15:clr>
             <a:srgbClr val="A4A3A4"/>
@@ -216,7 +228,7 @@
             <a:fld id="{1C0777A7-133F-4858-8AB3-833D62427676}" type="datetimeFigureOut">
               <a:rPr lang="en-US" smtClean="0"/>
               <a:pPr/>
-              <a:t>10/12/2013</a:t>
+              <a:t>10/26/2013</a:t>
             </a:fld>
             <a:endParaRPr lang="en-US"/>
           </a:p>
@@ -385,7 +397,7 @@
     </p:spTree>
     <p:extLst>
       <p:ext uri="{BB962C8B-B14F-4D97-AF65-F5344CB8AC3E}">
-        <p14:creationId xmlns:p14="http://schemas.microsoft.com/office/powerpoint/2010/main" val="2408685227"/>
+        <p14:creationId xmlns:p14="http://schemas.microsoft.com/office/powerpoint/2010/main" xmlns="" val="2408685227"/>
       </p:ext>
     </p:extLst>
   </p:cSld>
@@ -699,7 +711,7 @@
             <a:fld id="{B61BEF0D-F0BB-DE4B-95CE-6DB70DBA9567}" type="datetimeFigureOut">
               <a:rPr lang="en-US" smtClean="0"/>
               <a:pPr/>
-              <a:t>10/12/2013</a:t>
+              <a:t>10/26/2013</a:t>
             </a:fld>
             <a:endParaRPr lang="en-US" dirty="0"/>
           </a:p>
@@ -751,7 +763,7 @@
     </p:spTree>
     <p:extLst>
       <p:ext uri="{BB962C8B-B14F-4D97-AF65-F5344CB8AC3E}">
-        <p14:creationId xmlns:p14="http://schemas.microsoft.com/office/powerpoint/2010/main" val="201764440"/>
+        <p14:creationId xmlns:p14="http://schemas.microsoft.com/office/powerpoint/2010/main" xmlns="" val="201764440"/>
       </p:ext>
     </p:extLst>
   </p:cSld>
@@ -992,7 +1004,7 @@
             <a:fld id="{B61BEF0D-F0BB-DE4B-95CE-6DB70DBA9567}" type="datetimeFigureOut">
               <a:rPr lang="en-US" smtClean="0"/>
               <a:pPr/>
-              <a:t>10/12/2013</a:t>
+              <a:t>10/26/2013</a:t>
             </a:fld>
             <a:endParaRPr lang="en-US" dirty="0"/>
           </a:p>
@@ -1049,7 +1061,7 @@
     </p:spTree>
     <p:extLst>
       <p:ext uri="{BB962C8B-B14F-4D97-AF65-F5344CB8AC3E}">
-        <p14:creationId xmlns:p14="http://schemas.microsoft.com/office/powerpoint/2010/main" val="3783072073"/>
+        <p14:creationId xmlns:p14="http://schemas.microsoft.com/office/powerpoint/2010/main" xmlns="" val="3783072073"/>
       </p:ext>
     </p:extLst>
   </p:cSld>
@@ -1258,7 +1270,7 @@
             <a:fld id="{B61BEF0D-F0BB-DE4B-95CE-6DB70DBA9567}" type="datetimeFigureOut">
               <a:rPr lang="en-US" smtClean="0"/>
               <a:pPr/>
-              <a:t>10/12/2013</a:t>
+              <a:t>10/26/2013</a:t>
             </a:fld>
             <a:endParaRPr lang="en-US" dirty="0"/>
           </a:p>
@@ -1310,7 +1322,7 @@
     </p:spTree>
     <p:extLst>
       <p:ext uri="{BB962C8B-B14F-4D97-AF65-F5344CB8AC3E}">
-        <p14:creationId xmlns:p14="http://schemas.microsoft.com/office/powerpoint/2010/main" val="1595295306"/>
+        <p14:creationId xmlns:p14="http://schemas.microsoft.com/office/powerpoint/2010/main" xmlns="" val="1595295306"/>
       </p:ext>
     </p:extLst>
   </p:cSld>
@@ -1820,7 +1832,7 @@
             <a:fld id="{B61BEF0D-F0BB-DE4B-95CE-6DB70DBA9567}" type="datetimeFigureOut">
               <a:rPr lang="en-US" smtClean="0"/>
               <a:pPr/>
-              <a:t>10/12/2013</a:t>
+              <a:t>10/26/2013</a:t>
             </a:fld>
             <a:endParaRPr lang="en-US" dirty="0"/>
           </a:p>
@@ -1872,7 +1884,7 @@
     </p:spTree>
     <p:extLst>
       <p:ext uri="{BB962C8B-B14F-4D97-AF65-F5344CB8AC3E}">
-        <p14:creationId xmlns:p14="http://schemas.microsoft.com/office/powerpoint/2010/main" val="3337821985"/>
+        <p14:creationId xmlns:p14="http://schemas.microsoft.com/office/powerpoint/2010/main" xmlns="" val="3337821985"/>
       </p:ext>
     </p:extLst>
   </p:cSld>
@@ -2081,7 +2093,7 @@
             <a:fld id="{B61BEF0D-F0BB-DE4B-95CE-6DB70DBA9567}" type="datetimeFigureOut">
               <a:rPr lang="en-US" smtClean="0"/>
               <a:pPr/>
-              <a:t>10/12/2013</a:t>
+              <a:t>10/26/2013</a:t>
             </a:fld>
             <a:endParaRPr lang="en-US" dirty="0"/>
           </a:p>
@@ -2133,7 +2145,7 @@
     </p:spTree>
     <p:extLst>
       <p:ext uri="{BB962C8B-B14F-4D97-AF65-F5344CB8AC3E}">
-        <p14:creationId xmlns:p14="http://schemas.microsoft.com/office/powerpoint/2010/main" val="886269531"/>
+        <p14:creationId xmlns:p14="http://schemas.microsoft.com/office/powerpoint/2010/main" xmlns="" val="886269531"/>
       </p:ext>
     </p:extLst>
   </p:cSld>
@@ -2659,7 +2671,7 @@
             <a:fld id="{B61BEF0D-F0BB-DE4B-95CE-6DB70DBA9567}" type="datetimeFigureOut">
               <a:rPr lang="en-US" smtClean="0"/>
               <a:pPr/>
-              <a:t>10/12/2013</a:t>
+              <a:t>10/26/2013</a:t>
             </a:fld>
             <a:endParaRPr lang="en-US" dirty="0"/>
           </a:p>
@@ -2711,7 +2723,7 @@
     </p:spTree>
     <p:extLst>
       <p:ext uri="{BB962C8B-B14F-4D97-AF65-F5344CB8AC3E}">
-        <p14:creationId xmlns:p14="http://schemas.microsoft.com/office/powerpoint/2010/main" val="2590523876"/>
+        <p14:creationId xmlns:p14="http://schemas.microsoft.com/office/powerpoint/2010/main" xmlns="" val="2590523876"/>
       </p:ext>
     </p:extLst>
   </p:cSld>
@@ -2993,7 +3005,7 @@
             <a:fld id="{B61BEF0D-F0BB-DE4B-95CE-6DB70DBA9567}" type="datetimeFigureOut">
               <a:rPr lang="en-US" smtClean="0"/>
               <a:pPr/>
-              <a:t>10/12/2013</a:t>
+              <a:t>10/26/2013</a:t>
             </a:fld>
             <a:endParaRPr lang="en-US" dirty="0"/>
           </a:p>
@@ -3045,7 +3057,7 @@
     </p:spTree>
     <p:extLst>
       <p:ext uri="{BB962C8B-B14F-4D97-AF65-F5344CB8AC3E}">
-        <p14:creationId xmlns:p14="http://schemas.microsoft.com/office/powerpoint/2010/main" val="2759155521"/>
+        <p14:creationId xmlns:p14="http://schemas.microsoft.com/office/powerpoint/2010/main" xmlns="" val="2759155521"/>
       </p:ext>
     </p:extLst>
   </p:cSld>
@@ -3170,7 +3182,7 @@
             <a:fld id="{B61BEF0D-F0BB-DE4B-95CE-6DB70DBA9567}" type="datetimeFigureOut">
               <a:rPr lang="en-US" smtClean="0"/>
               <a:pPr/>
-              <a:t>10/12/2013</a:t>
+              <a:t>10/26/2013</a:t>
             </a:fld>
             <a:endParaRPr lang="en-US" dirty="0"/>
           </a:p>
@@ -3222,7 +3234,7 @@
     </p:spTree>
     <p:extLst>
       <p:ext uri="{BB962C8B-B14F-4D97-AF65-F5344CB8AC3E}">
-        <p14:creationId xmlns:p14="http://schemas.microsoft.com/office/powerpoint/2010/main" val="1435342287"/>
+        <p14:creationId xmlns:p14="http://schemas.microsoft.com/office/powerpoint/2010/main" xmlns="" val="1435342287"/>
       </p:ext>
     </p:extLst>
   </p:cSld>
@@ -3352,7 +3364,7 @@
             <a:fld id="{B61BEF0D-F0BB-DE4B-95CE-6DB70DBA9567}" type="datetimeFigureOut">
               <a:rPr lang="en-US" smtClean="0"/>
               <a:pPr/>
-              <a:t>10/12/2013</a:t>
+              <a:t>10/26/2013</a:t>
             </a:fld>
             <a:endParaRPr lang="en-US" dirty="0"/>
           </a:p>
@@ -3404,7 +3416,7 @@
     </p:spTree>
     <p:extLst>
       <p:ext uri="{BB962C8B-B14F-4D97-AF65-F5344CB8AC3E}">
-        <p14:creationId xmlns:p14="http://schemas.microsoft.com/office/powerpoint/2010/main" val="681154642"/>
+        <p14:creationId xmlns:p14="http://schemas.microsoft.com/office/powerpoint/2010/main" xmlns="" val="681154642"/>
       </p:ext>
     </p:extLst>
   </p:cSld>
@@ -3524,7 +3536,7 @@
             <a:fld id="{B61BEF0D-F0BB-DE4B-95CE-6DB70DBA9567}" type="datetimeFigureOut">
               <a:rPr lang="en-US" smtClean="0"/>
               <a:pPr/>
-              <a:t>10/12/2013</a:t>
+              <a:t>10/26/2013</a:t>
             </a:fld>
             <a:endParaRPr lang="en-US" dirty="0"/>
           </a:p>
@@ -3576,7 +3588,7 @@
     </p:spTree>
     <p:extLst>
       <p:ext uri="{BB962C8B-B14F-4D97-AF65-F5344CB8AC3E}">
-        <p14:creationId xmlns:p14="http://schemas.microsoft.com/office/powerpoint/2010/main" val="4245128215"/>
+        <p14:creationId xmlns:p14="http://schemas.microsoft.com/office/powerpoint/2010/main" xmlns="" val="4245128215"/>
       </p:ext>
     </p:extLst>
   </p:cSld>
@@ -3785,7 +3797,7 @@
             <a:fld id="{B61BEF0D-F0BB-DE4B-95CE-6DB70DBA9567}" type="datetimeFigureOut">
               <a:rPr lang="en-US" smtClean="0"/>
               <a:pPr/>
-              <a:t>10/12/2013</a:t>
+              <a:t>10/26/2013</a:t>
             </a:fld>
             <a:endParaRPr lang="en-US" dirty="0"/>
           </a:p>
@@ -3837,7 +3849,7 @@
     </p:spTree>
     <p:extLst>
       <p:ext uri="{BB962C8B-B14F-4D97-AF65-F5344CB8AC3E}">
-        <p14:creationId xmlns:p14="http://schemas.microsoft.com/office/powerpoint/2010/main" val="2266164164"/>
+        <p14:creationId xmlns:p14="http://schemas.microsoft.com/office/powerpoint/2010/main" xmlns="" val="2266164164"/>
       </p:ext>
     </p:extLst>
   </p:cSld>
@@ -4079,7 +4091,7 @@
             <a:fld id="{B61BEF0D-F0BB-DE4B-95CE-6DB70DBA9567}" type="datetimeFigureOut">
               <a:rPr lang="en-US" smtClean="0"/>
               <a:pPr/>
-              <a:t>10/12/2013</a:t>
+              <a:t>10/26/2013</a:t>
             </a:fld>
             <a:endParaRPr lang="en-US" dirty="0"/>
           </a:p>
@@ -4131,7 +4143,7 @@
     </p:spTree>
     <p:extLst>
       <p:ext uri="{BB962C8B-B14F-4D97-AF65-F5344CB8AC3E}">
-        <p14:creationId xmlns:p14="http://schemas.microsoft.com/office/powerpoint/2010/main" val="148630802"/>
+        <p14:creationId xmlns:p14="http://schemas.microsoft.com/office/powerpoint/2010/main" xmlns="" val="148630802"/>
       </p:ext>
     </p:extLst>
   </p:cSld>
@@ -4511,7 +4523,7 @@
             <a:fld id="{B61BEF0D-F0BB-DE4B-95CE-6DB70DBA9567}" type="datetimeFigureOut">
               <a:rPr lang="en-US" smtClean="0"/>
               <a:pPr/>
-              <a:t>10/12/2013</a:t>
+              <a:t>10/26/2013</a:t>
             </a:fld>
             <a:endParaRPr lang="en-US" dirty="0"/>
           </a:p>
@@ -4563,7 +4575,7 @@
     </p:spTree>
     <p:extLst>
       <p:ext uri="{BB962C8B-B14F-4D97-AF65-F5344CB8AC3E}">
-        <p14:creationId xmlns:p14="http://schemas.microsoft.com/office/powerpoint/2010/main" val="563240317"/>
+        <p14:creationId xmlns:p14="http://schemas.microsoft.com/office/powerpoint/2010/main" xmlns="" val="563240317"/>
       </p:ext>
     </p:extLst>
   </p:cSld>
@@ -4637,7 +4649,7 @@
             <a:fld id="{B61BEF0D-F0BB-DE4B-95CE-6DB70DBA9567}" type="datetimeFigureOut">
               <a:rPr lang="en-US" smtClean="0"/>
               <a:pPr/>
-              <a:t>10/12/2013</a:t>
+              <a:t>10/26/2013</a:t>
             </a:fld>
             <a:endParaRPr lang="en-US" dirty="0"/>
           </a:p>
@@ -4689,7 +4701,7 @@
     </p:spTree>
     <p:extLst>
       <p:ext uri="{BB962C8B-B14F-4D97-AF65-F5344CB8AC3E}">
-        <p14:creationId xmlns:p14="http://schemas.microsoft.com/office/powerpoint/2010/main" val="3238447542"/>
+        <p14:creationId xmlns:p14="http://schemas.microsoft.com/office/powerpoint/2010/main" xmlns="" val="3238447542"/>
       </p:ext>
     </p:extLst>
   </p:cSld>
@@ -4734,7 +4746,7 @@
             <a:fld id="{B61BEF0D-F0BB-DE4B-95CE-6DB70DBA9567}" type="datetimeFigureOut">
               <a:rPr lang="en-US" smtClean="0"/>
               <a:pPr/>
-              <a:t>10/12/2013</a:t>
+              <a:t>10/26/2013</a:t>
             </a:fld>
             <a:endParaRPr lang="en-US" dirty="0"/>
           </a:p>
@@ -4786,7 +4798,7 @@
     </p:spTree>
     <p:extLst>
       <p:ext uri="{BB962C8B-B14F-4D97-AF65-F5344CB8AC3E}">
-        <p14:creationId xmlns:p14="http://schemas.microsoft.com/office/powerpoint/2010/main" val="2027820632"/>
+        <p14:creationId xmlns:p14="http://schemas.microsoft.com/office/powerpoint/2010/main" xmlns="" val="2027820632"/>
       </p:ext>
     </p:extLst>
   </p:cSld>
@@ -5019,7 +5031,7 @@
             <a:fld id="{B61BEF0D-F0BB-DE4B-95CE-6DB70DBA9567}" type="datetimeFigureOut">
               <a:rPr lang="en-US" smtClean="0"/>
               <a:pPr/>
-              <a:t>10/12/2013</a:t>
+              <a:t>10/26/2013</a:t>
             </a:fld>
             <a:endParaRPr lang="en-US" dirty="0"/>
           </a:p>
@@ -5071,7 +5083,7 @@
     </p:spTree>
     <p:extLst>
       <p:ext uri="{BB962C8B-B14F-4D97-AF65-F5344CB8AC3E}">
-        <p14:creationId xmlns:p14="http://schemas.microsoft.com/office/powerpoint/2010/main" val="712994137"/>
+        <p14:creationId xmlns:p14="http://schemas.microsoft.com/office/powerpoint/2010/main" xmlns="" val="712994137"/>
       </p:ext>
     </p:extLst>
   </p:cSld>
@@ -5312,7 +5324,7 @@
             <a:fld id="{B61BEF0D-F0BB-DE4B-95CE-6DB70DBA9567}" type="datetimeFigureOut">
               <a:rPr lang="en-US" smtClean="0"/>
               <a:pPr/>
-              <a:t>10/12/2013</a:t>
+              <a:t>10/26/2013</a:t>
             </a:fld>
             <a:endParaRPr lang="en-US" dirty="0"/>
           </a:p>
@@ -5374,7 +5386,7 @@
     </p:spTree>
     <p:extLst>
       <p:ext uri="{BB962C8B-B14F-4D97-AF65-F5344CB8AC3E}">
-        <p14:creationId xmlns:p14="http://schemas.microsoft.com/office/powerpoint/2010/main" val="2328979833"/>
+        <p14:creationId xmlns:p14="http://schemas.microsoft.com/office/powerpoint/2010/main" xmlns="" val="2328979833"/>
       </p:ext>
     </p:extLst>
   </p:cSld>
@@ -5545,7 +5557,7 @@
             <a:fld id="{B61BEF0D-F0BB-DE4B-95CE-6DB70DBA9567}" type="datetimeFigureOut">
               <a:rPr lang="en-US" smtClean="0"/>
               <a:pPr/>
-              <a:t>10/12/2013</a:t>
+              <a:t>10/26/2013</a:t>
             </a:fld>
             <a:endParaRPr lang="en-US" dirty="0"/>
           </a:p>
@@ -5649,7 +5661,7 @@
     </p:spTree>
     <p:extLst>
       <p:ext uri="{BB962C8B-B14F-4D97-AF65-F5344CB8AC3E}">
-        <p14:creationId xmlns:p14="http://schemas.microsoft.com/office/powerpoint/2010/main" val="1737108718"/>
+        <p14:creationId xmlns:p14="http://schemas.microsoft.com/office/powerpoint/2010/main" xmlns="" val="1737108718"/>
       </p:ext>
     </p:extLst>
   </p:cSld>
@@ -6379,9 +6391,2306 @@
     </p:spTree>
     <p:extLst>
       <p:ext uri="{BB962C8B-B14F-4D97-AF65-F5344CB8AC3E}">
-        <p14:creationId xmlns:p14="http://schemas.microsoft.com/office/powerpoint/2010/main" val="3831373085"/>
+        <p14:creationId xmlns:p14="http://schemas.microsoft.com/office/powerpoint/2010/main" xmlns="" val="3831373085"/>
       </p:ext>
     </p:extLst>
+  </p:cSld>
+  <p:clrMapOvr>
+    <a:masterClrMapping/>
+  </p:clrMapOvr>
+  <p:timing>
+    <p:tnLst>
+      <p:par>
+        <p:cTn id="1" dur="indefinite" restart="never" nodeType="tmRoot"/>
+      </p:par>
+    </p:tnLst>
+  </p:timing>
+</p:sld>
+</file>
+
+<file path=ppt/slides/slide10.xml><?xml version="1.0" encoding="utf-8"?>
+<p:sld xmlns:a="http://schemas.openxmlformats.org/drawingml/2006/main" xmlns:r="http://schemas.openxmlformats.org/officeDocument/2006/relationships" xmlns:p="http://schemas.openxmlformats.org/presentationml/2006/main">
+  <p:cSld>
+    <p:spTree>
+      <p:nvGrpSpPr>
+        <p:cNvPr id="1" name=""/>
+        <p:cNvGrpSpPr/>
+        <p:nvPr/>
+      </p:nvGrpSpPr>
+      <p:grpSpPr>
+        <a:xfrm>
+          <a:off x="0" y="0"/>
+          <a:ext cx="0" cy="0"/>
+          <a:chOff x="0" y="0"/>
+          <a:chExt cx="0" cy="0"/>
+        </a:xfrm>
+      </p:grpSpPr>
+      <p:sp>
+        <p:nvSpPr>
+          <p:cNvPr id="2" name="Заголовок 1"/>
+          <p:cNvSpPr>
+            <a:spLocks noGrp="1"/>
+          </p:cNvSpPr>
+          <p:nvPr>
+            <p:ph type="title"/>
+          </p:nvPr>
+        </p:nvSpPr>
+        <p:spPr/>
+        <p:txBody>
+          <a:bodyPr/>
+          <a:lstStyle/>
+          <a:p>
+            <a:r>
+              <a:rPr lang="ru-RU" dirty="0" smtClean="0"/>
+              <a:t>пример</a:t>
+            </a:r>
+            <a:endParaRPr lang="ru-RU" dirty="0"/>
+          </a:p>
+        </p:txBody>
+      </p:sp>
+      <p:sp>
+        <p:nvSpPr>
+          <p:cNvPr id="3" name="Содержимое 2"/>
+          <p:cNvSpPr>
+            <a:spLocks noGrp="1"/>
+          </p:cNvSpPr>
+          <p:nvPr>
+            <p:ph idx="1"/>
+          </p:nvPr>
+        </p:nvSpPr>
+        <p:spPr/>
+        <p:txBody>
+          <a:bodyPr/>
+          <a:lstStyle/>
+          <a:p>
+            <a:pPr>
+              <a:buNone/>
+            </a:pPr>
+            <a:r>
+              <a:rPr lang="en-US" dirty="0" smtClean="0"/>
+              <a:t>APPLY(</a:t>
+            </a:r>
+            <a:r>
+              <a:rPr lang="en-US" dirty="0" err="1" smtClean="0"/>
+              <a:t>passID</a:t>
+            </a:r>
+            <a:r>
+              <a:rPr lang="en-US" dirty="0" smtClean="0"/>
+              <a:t>, </a:t>
+            </a:r>
+            <a:r>
+              <a:rPr lang="en-US" dirty="0" err="1" smtClean="0"/>
+              <a:t>uName</a:t>
+            </a:r>
+            <a:r>
+              <a:rPr lang="en-US" dirty="0" smtClean="0"/>
+              <a:t>, region, date, major)</a:t>
+            </a:r>
+          </a:p>
+          <a:p>
+            <a:pPr>
+              <a:buNone/>
+            </a:pPr>
+            <a:endParaRPr lang="en-US" dirty="0" smtClean="0"/>
+          </a:p>
+          <a:p>
+            <a:pPr>
+              <a:buNone/>
+            </a:pPr>
+            <a:r>
+              <a:rPr lang="en-US" dirty="0" err="1" smtClean="0"/>
+              <a:t>uName</a:t>
+            </a:r>
+            <a:r>
+              <a:rPr lang="en-US" dirty="0" smtClean="0"/>
+              <a:t> → date</a:t>
+            </a:r>
+          </a:p>
+          <a:p>
+            <a:pPr>
+              <a:buNone/>
+            </a:pPr>
+            <a:r>
+              <a:rPr lang="en-US" dirty="0" err="1" smtClean="0"/>
+              <a:t>passID</a:t>
+            </a:r>
+            <a:r>
+              <a:rPr lang="en-US" dirty="0" smtClean="0"/>
+              <a:t>, </a:t>
+            </a:r>
+            <a:r>
+              <a:rPr lang="en-US" dirty="0" err="1" smtClean="0"/>
+              <a:t>uName</a:t>
+            </a:r>
+            <a:r>
+              <a:rPr lang="en-US" dirty="0" smtClean="0"/>
+              <a:t> → major</a:t>
+            </a:r>
+          </a:p>
+          <a:p>
+            <a:pPr>
+              <a:buNone/>
+            </a:pPr>
+            <a:r>
+              <a:rPr lang="en-US" dirty="0" err="1" smtClean="0"/>
+              <a:t>passID</a:t>
+            </a:r>
+            <a:r>
+              <a:rPr lang="en-US" dirty="0" smtClean="0"/>
+              <a:t> </a:t>
+            </a:r>
+            <a:r>
+              <a:rPr lang="en-US" dirty="0" smtClean="0"/>
+              <a:t>→ region</a:t>
+            </a:r>
+            <a:endParaRPr lang="ru-RU" dirty="0"/>
+          </a:p>
+        </p:txBody>
+      </p:sp>
+    </p:spTree>
+  </p:cSld>
+  <p:clrMapOvr>
+    <a:masterClrMapping/>
+  </p:clrMapOvr>
+  <p:timing>
+    <p:tnLst>
+      <p:par>
+        <p:cTn id="1" dur="indefinite" restart="never" nodeType="tmRoot"/>
+      </p:par>
+    </p:tnLst>
+  </p:timing>
+</p:sld>
+</file>
+
+<file path=ppt/slides/slide11.xml><?xml version="1.0" encoding="utf-8"?>
+<p:sld xmlns:a="http://schemas.openxmlformats.org/drawingml/2006/main" xmlns:r="http://schemas.openxmlformats.org/officeDocument/2006/relationships" xmlns:p="http://schemas.openxmlformats.org/presentationml/2006/main">
+  <p:cSld>
+    <p:spTree>
+      <p:nvGrpSpPr>
+        <p:cNvPr id="1" name=""/>
+        <p:cNvGrpSpPr/>
+        <p:nvPr/>
+      </p:nvGrpSpPr>
+      <p:grpSpPr>
+        <a:xfrm>
+          <a:off x="0" y="0"/>
+          <a:ext cx="0" cy="0"/>
+          <a:chOff x="0" y="0"/>
+          <a:chExt cx="0" cy="0"/>
+        </a:xfrm>
+      </p:grpSpPr>
+      <p:sp>
+        <p:nvSpPr>
+          <p:cNvPr id="2" name="Заголовок 1"/>
+          <p:cNvSpPr>
+            <a:spLocks noGrp="1"/>
+          </p:cNvSpPr>
+          <p:nvPr>
+            <p:ph type="title"/>
+          </p:nvPr>
+        </p:nvSpPr>
+        <p:spPr/>
+        <p:txBody>
+          <a:bodyPr/>
+          <a:lstStyle/>
+          <a:p>
+            <a:r>
+              <a:rPr lang="ru-RU" dirty="0" smtClean="0"/>
+              <a:t>Вопрос</a:t>
+            </a:r>
+            <a:endParaRPr lang="ru-RU" dirty="0"/>
+          </a:p>
+        </p:txBody>
+      </p:sp>
+      <p:sp>
+        <p:nvSpPr>
+          <p:cNvPr id="3" name="Содержимое 2"/>
+          <p:cNvSpPr>
+            <a:spLocks noGrp="1"/>
+          </p:cNvSpPr>
+          <p:nvPr>
+            <p:ph idx="1"/>
+          </p:nvPr>
+        </p:nvSpPr>
+        <p:spPr/>
+        <p:txBody>
+          <a:bodyPr/>
+          <a:lstStyle/>
+          <a:p>
+            <a:pPr>
+              <a:buNone/>
+            </a:pPr>
+            <a:r>
+              <a:rPr lang="ru-RU" dirty="0" smtClean="0"/>
+              <a:t>Для отношения </a:t>
+            </a:r>
+            <a:r>
+              <a:rPr lang="en-US" dirty="0" smtClean="0"/>
+              <a:t>Apply(</a:t>
+            </a:r>
+            <a:r>
+              <a:rPr lang="en-US" dirty="0" err="1" smtClean="0"/>
+              <a:t>passID</a:t>
+            </a:r>
+            <a:r>
+              <a:rPr lang="en-US" dirty="0" smtClean="0"/>
+              <a:t>, </a:t>
+            </a:r>
+            <a:r>
+              <a:rPr lang="en-US" dirty="0" err="1" smtClean="0"/>
+              <a:t>uName</a:t>
+            </a:r>
+            <a:r>
+              <a:rPr lang="en-US" dirty="0" smtClean="0"/>
+              <a:t>, region, date, major), </a:t>
+            </a:r>
+            <a:r>
+              <a:rPr lang="ru-RU" dirty="0" smtClean="0"/>
+              <a:t>какое реальное ограничение задается с помощью </a:t>
+            </a:r>
+            <a:r>
+              <a:rPr lang="en-US" dirty="0" err="1" smtClean="0"/>
+              <a:t>passID,uName</a:t>
+            </a:r>
+            <a:r>
+              <a:rPr lang="en-US" dirty="0" smtClean="0"/>
+              <a:t> → date</a:t>
+            </a:r>
+          </a:p>
+          <a:p>
+            <a:pPr>
+              <a:buNone/>
+            </a:pPr>
+            <a:endParaRPr lang="en-US" dirty="0" smtClean="0"/>
+          </a:p>
+          <a:p>
+            <a:pPr>
+              <a:buFont typeface="Arial" charset="0"/>
+              <a:buChar char="•"/>
+            </a:pPr>
+            <a:r>
+              <a:rPr lang="ru-RU" dirty="0" smtClean="0"/>
+              <a:t>Студент может подавать документы в один университет</a:t>
+            </a:r>
+          </a:p>
+          <a:p>
+            <a:pPr>
+              <a:buFont typeface="Arial" charset="0"/>
+              <a:buChar char="•"/>
+            </a:pPr>
+            <a:r>
+              <a:rPr lang="ru-RU" dirty="0" smtClean="0"/>
+              <a:t>Студент может подавать документ в каждый университет только один раз</a:t>
+            </a:r>
+          </a:p>
+          <a:p>
+            <a:pPr>
+              <a:buFont typeface="Arial" charset="0"/>
+              <a:buChar char="•"/>
+            </a:pPr>
+            <a:r>
+              <a:rPr lang="ru-RU" dirty="0" smtClean="0"/>
+              <a:t>Студент должен подавать документы во все университеты в одно и то же время</a:t>
+            </a:r>
+          </a:p>
+          <a:p>
+            <a:pPr>
+              <a:buFont typeface="Arial" charset="0"/>
+              <a:buChar char="•"/>
+            </a:pPr>
+            <a:r>
+              <a:rPr lang="ru-RU" dirty="0" smtClean="0"/>
+              <a:t>Все заявки от студента в какой-то определенный университет должны иметь одну и ту же дату</a:t>
+            </a:r>
+            <a:endParaRPr lang="ru-RU" dirty="0"/>
+          </a:p>
+        </p:txBody>
+      </p:sp>
+    </p:spTree>
+  </p:cSld>
+  <p:clrMapOvr>
+    <a:masterClrMapping/>
+  </p:clrMapOvr>
+  <p:timing>
+    <p:tnLst>
+      <p:par>
+        <p:cTn id="1" dur="indefinite" restart="never" nodeType="tmRoot"/>
+      </p:par>
+    </p:tnLst>
+  </p:timing>
+</p:sld>
+</file>
+
+<file path=ppt/slides/slide12.xml><?xml version="1.0" encoding="utf-8"?>
+<p:sld xmlns:a="http://schemas.openxmlformats.org/drawingml/2006/main" xmlns:r="http://schemas.openxmlformats.org/officeDocument/2006/relationships" xmlns:p="http://schemas.openxmlformats.org/presentationml/2006/main">
+  <p:cSld>
+    <p:spTree>
+      <p:nvGrpSpPr>
+        <p:cNvPr id="1" name=""/>
+        <p:cNvGrpSpPr/>
+        <p:nvPr/>
+      </p:nvGrpSpPr>
+      <p:grpSpPr>
+        <a:xfrm>
+          <a:off x="0" y="0"/>
+          <a:ext cx="0" cy="0"/>
+          <a:chOff x="0" y="0"/>
+          <a:chExt cx="0" cy="0"/>
+        </a:xfrm>
+      </p:grpSpPr>
+      <p:sp>
+        <p:nvSpPr>
+          <p:cNvPr id="2" name="Заголовок 1"/>
+          <p:cNvSpPr>
+            <a:spLocks noGrp="1"/>
+          </p:cNvSpPr>
+          <p:nvPr>
+            <p:ph type="title"/>
+          </p:nvPr>
+        </p:nvSpPr>
+        <p:spPr/>
+        <p:txBody>
+          <a:bodyPr/>
+          <a:lstStyle/>
+          <a:p>
+            <a:r>
+              <a:rPr lang="ru-RU" dirty="0" smtClean="0"/>
+              <a:t>Функциональные зависимости и ключи</a:t>
+            </a:r>
+            <a:endParaRPr lang="ru-RU" dirty="0"/>
+          </a:p>
+        </p:txBody>
+      </p:sp>
+      <p:sp>
+        <p:nvSpPr>
+          <p:cNvPr id="3" name="Содержимое 2"/>
+          <p:cNvSpPr>
+            <a:spLocks noGrp="1"/>
+          </p:cNvSpPr>
+          <p:nvPr>
+            <p:ph idx="1"/>
+          </p:nvPr>
+        </p:nvSpPr>
+        <p:spPr/>
+        <p:txBody>
+          <a:bodyPr/>
+          <a:lstStyle/>
+          <a:p>
+            <a:r>
+              <a:rPr lang="ru-RU" dirty="0" smtClean="0"/>
+              <a:t>Отношение без дубликатов</a:t>
+            </a:r>
+          </a:p>
+          <a:p>
+            <a:r>
+              <a:rPr lang="ru-RU" dirty="0" smtClean="0"/>
+              <a:t>Предположим, </a:t>
+            </a:r>
+            <a:r>
+              <a:rPr lang="en-US" dirty="0" smtClean="0"/>
+              <a:t>{A1, …, An} </a:t>
+            </a:r>
+            <a:r>
+              <a:rPr lang="ru-RU" dirty="0" smtClean="0"/>
+              <a:t>определяет все атрибуты, </a:t>
+            </a:r>
+            <a:r>
+              <a:rPr lang="en-US" dirty="0" smtClean="0"/>
+              <a:t>R(Ā,Ē)</a:t>
+            </a:r>
+            <a:endParaRPr lang="ru-RU" dirty="0" smtClean="0"/>
+          </a:p>
+          <a:p>
+            <a:pPr lvl="1">
+              <a:buNone/>
+            </a:pPr>
+            <a:r>
+              <a:rPr lang="en-US" dirty="0" smtClean="0"/>
+              <a:t>{A1, …, An} → {E1, …, </a:t>
+            </a:r>
+            <a:r>
+              <a:rPr lang="en-US" dirty="0" err="1" smtClean="0"/>
+              <a:t>Em</a:t>
+            </a:r>
+            <a:r>
+              <a:rPr lang="en-US" dirty="0" smtClean="0"/>
+              <a:t>}</a:t>
+            </a:r>
+            <a:endParaRPr lang="ru-RU" dirty="0" smtClean="0"/>
+          </a:p>
+          <a:p>
+            <a:r>
+              <a:rPr lang="ru-RU" dirty="0" smtClean="0"/>
+              <a:t>Тогда</a:t>
+            </a:r>
+            <a:r>
+              <a:rPr lang="en-US" dirty="0" smtClean="0"/>
+              <a:t> Ā – </a:t>
+            </a:r>
+            <a:r>
+              <a:rPr lang="ru-RU" dirty="0" smtClean="0"/>
+              <a:t>ключ</a:t>
+            </a:r>
+            <a:endParaRPr lang="ru-RU" dirty="0"/>
+          </a:p>
+        </p:txBody>
+      </p:sp>
+    </p:spTree>
+  </p:cSld>
+  <p:clrMapOvr>
+    <a:masterClrMapping/>
+  </p:clrMapOvr>
+  <p:timing>
+    <p:tnLst>
+      <p:par>
+        <p:cTn id="1" dur="indefinite" restart="never" nodeType="tmRoot"/>
+      </p:par>
+    </p:tnLst>
+  </p:timing>
+</p:sld>
+</file>
+
+<file path=ppt/slides/slide13.xml><?xml version="1.0" encoding="utf-8"?>
+<p:sld xmlns:a="http://schemas.openxmlformats.org/drawingml/2006/main" xmlns:r="http://schemas.openxmlformats.org/officeDocument/2006/relationships" xmlns:p="http://schemas.openxmlformats.org/presentationml/2006/main">
+  <p:cSld>
+    <p:spTree>
+      <p:nvGrpSpPr>
+        <p:cNvPr id="1" name=""/>
+        <p:cNvGrpSpPr/>
+        <p:nvPr/>
+      </p:nvGrpSpPr>
+      <p:grpSpPr>
+        <a:xfrm>
+          <a:off x="0" y="0"/>
+          <a:ext cx="0" cy="0"/>
+          <a:chOff x="0" y="0"/>
+          <a:chExt cx="0" cy="0"/>
+        </a:xfrm>
+      </p:grpSpPr>
+      <p:sp>
+        <p:nvSpPr>
+          <p:cNvPr id="2" name="Заголовок 1"/>
+          <p:cNvSpPr>
+            <a:spLocks noGrp="1"/>
+          </p:cNvSpPr>
+          <p:nvPr>
+            <p:ph type="title"/>
+          </p:nvPr>
+        </p:nvSpPr>
+        <p:spPr/>
+        <p:txBody>
+          <a:bodyPr/>
+          <a:lstStyle/>
+          <a:p>
+            <a:r>
+              <a:rPr lang="ru-RU" dirty="0" smtClean="0"/>
+              <a:t>Виды зависимостей</a:t>
+            </a:r>
+            <a:endParaRPr lang="ru-RU" dirty="0"/>
+          </a:p>
+        </p:txBody>
+      </p:sp>
+      <p:sp>
+        <p:nvSpPr>
+          <p:cNvPr id="3" name="Содержимое 2"/>
+          <p:cNvSpPr>
+            <a:spLocks noGrp="1"/>
+          </p:cNvSpPr>
+          <p:nvPr>
+            <p:ph idx="1"/>
+          </p:nvPr>
+        </p:nvSpPr>
+        <p:spPr/>
+        <p:txBody>
+          <a:bodyPr/>
+          <a:lstStyle/>
+          <a:p>
+            <a:r>
+              <a:rPr lang="ru-RU" dirty="0" smtClean="0"/>
+              <a:t>Тривиальная</a:t>
+            </a:r>
+          </a:p>
+          <a:p>
+            <a:pPr lvl="1">
+              <a:buNone/>
+            </a:pPr>
+            <a:r>
+              <a:rPr lang="en-US" dirty="0" smtClean="0"/>
+              <a:t>{A1, …, An} -&gt; {E1, …, </a:t>
+            </a:r>
+            <a:r>
+              <a:rPr lang="en-US" dirty="0" err="1" smtClean="0"/>
+              <a:t>Em</a:t>
+            </a:r>
+            <a:r>
+              <a:rPr lang="en-US" dirty="0" smtClean="0"/>
+              <a:t>}, Ē </a:t>
+            </a:r>
+            <a:r>
+              <a:rPr lang="ru-RU" dirty="0" smtClean="0"/>
+              <a:t>подмножество </a:t>
+            </a:r>
+            <a:r>
+              <a:rPr lang="en-US" dirty="0" smtClean="0"/>
+              <a:t>Ā</a:t>
+            </a:r>
+            <a:endParaRPr lang="ru-RU" dirty="0" smtClean="0"/>
+          </a:p>
+          <a:p>
+            <a:r>
+              <a:rPr lang="ru-RU" dirty="0" err="1" smtClean="0"/>
+              <a:t>Нетрививальная</a:t>
+            </a:r>
+            <a:endParaRPr lang="en-US" dirty="0" smtClean="0"/>
+          </a:p>
+          <a:p>
+            <a:pPr marL="285750" lvl="1">
+              <a:buNone/>
+            </a:pPr>
+            <a:r>
+              <a:rPr lang="en-US" dirty="0" smtClean="0"/>
+              <a:t>		</a:t>
+            </a:r>
+            <a:r>
+              <a:rPr lang="en-US" dirty="0" smtClean="0"/>
+              <a:t>{A1, …, An} -&gt; {E1, …, </a:t>
+            </a:r>
+            <a:r>
+              <a:rPr lang="en-US" dirty="0" err="1" smtClean="0"/>
+              <a:t>Em</a:t>
+            </a:r>
+            <a:r>
+              <a:rPr lang="en-US" dirty="0" smtClean="0"/>
+              <a:t>}, Ē </a:t>
+            </a:r>
+            <a:r>
+              <a:rPr lang="ru-RU" dirty="0" smtClean="0"/>
+              <a:t>не является подмножеством </a:t>
+            </a:r>
+            <a:r>
+              <a:rPr lang="en-US" dirty="0" smtClean="0"/>
+              <a:t>Ā</a:t>
+            </a:r>
+            <a:endParaRPr lang="ru-RU" dirty="0" smtClean="0"/>
+          </a:p>
+          <a:p>
+            <a:r>
+              <a:rPr lang="ru-RU" dirty="0" smtClean="0"/>
+              <a:t>Полностью нетривиальная</a:t>
+            </a:r>
+          </a:p>
+          <a:p>
+            <a:pPr marL="285750" lvl="1">
+              <a:buNone/>
+            </a:pPr>
+            <a:r>
+              <a:rPr lang="en-US" dirty="0" smtClean="0"/>
+              <a:t>		{A1, …, An} -&gt; {E1, …, </a:t>
+            </a:r>
+            <a:r>
+              <a:rPr lang="en-US" dirty="0" err="1" smtClean="0"/>
+              <a:t>Em</a:t>
+            </a:r>
+            <a:r>
+              <a:rPr lang="en-US" dirty="0" smtClean="0"/>
+              <a:t>}, Ē </a:t>
+            </a:r>
+            <a:r>
+              <a:rPr lang="ru-RU" dirty="0" smtClean="0"/>
+              <a:t>не </a:t>
+            </a:r>
+            <a:r>
+              <a:rPr lang="ru-RU" dirty="0" smtClean="0"/>
+              <a:t>пересекается с </a:t>
+            </a:r>
+            <a:r>
+              <a:rPr lang="en-US" dirty="0" smtClean="0"/>
+              <a:t>Ā</a:t>
+            </a:r>
+            <a:endParaRPr lang="ru-RU" dirty="0" smtClean="0"/>
+          </a:p>
+        </p:txBody>
+      </p:sp>
+    </p:spTree>
+  </p:cSld>
+  <p:clrMapOvr>
+    <a:masterClrMapping/>
+  </p:clrMapOvr>
+  <p:timing>
+    <p:tnLst>
+      <p:par>
+        <p:cTn id="1" dur="indefinite" restart="never" nodeType="tmRoot"/>
+      </p:par>
+    </p:tnLst>
+  </p:timing>
+</p:sld>
+</file>
+
+<file path=ppt/slides/slide14.xml><?xml version="1.0" encoding="utf-8"?>
+<p:sld xmlns:a="http://schemas.openxmlformats.org/drawingml/2006/main" xmlns:r="http://schemas.openxmlformats.org/officeDocument/2006/relationships" xmlns:p="http://schemas.openxmlformats.org/presentationml/2006/main">
+  <p:cSld>
+    <p:spTree>
+      <p:nvGrpSpPr>
+        <p:cNvPr id="1" name=""/>
+        <p:cNvGrpSpPr/>
+        <p:nvPr/>
+      </p:nvGrpSpPr>
+      <p:grpSpPr>
+        <a:xfrm>
+          <a:off x="0" y="0"/>
+          <a:ext cx="0" cy="0"/>
+          <a:chOff x="0" y="0"/>
+          <a:chExt cx="0" cy="0"/>
+        </a:xfrm>
+      </p:grpSpPr>
+      <p:sp>
+        <p:nvSpPr>
+          <p:cNvPr id="2" name="Заголовок 1"/>
+          <p:cNvSpPr>
+            <a:spLocks noGrp="1"/>
+          </p:cNvSpPr>
+          <p:nvPr>
+            <p:ph type="title"/>
+          </p:nvPr>
+        </p:nvSpPr>
+        <p:spPr/>
+        <p:txBody>
+          <a:bodyPr/>
+          <a:lstStyle/>
+          <a:p>
+            <a:r>
+              <a:rPr lang="ru-RU" dirty="0" smtClean="0"/>
+              <a:t>Правила</a:t>
+            </a:r>
+            <a:endParaRPr lang="ru-RU" dirty="0"/>
+          </a:p>
+        </p:txBody>
+      </p:sp>
+      <p:sp>
+        <p:nvSpPr>
+          <p:cNvPr id="3" name="Содержимое 2"/>
+          <p:cNvSpPr>
+            <a:spLocks noGrp="1"/>
+          </p:cNvSpPr>
+          <p:nvPr>
+            <p:ph idx="1"/>
+          </p:nvPr>
+        </p:nvSpPr>
+        <p:spPr>
+          <a:xfrm>
+            <a:off x="818348" y="1628775"/>
+            <a:ext cx="7511472" cy="4473285"/>
+          </a:xfrm>
+        </p:spPr>
+        <p:txBody>
+          <a:bodyPr>
+            <a:normAutofit/>
+          </a:bodyPr>
+          <a:lstStyle/>
+          <a:p>
+            <a:r>
+              <a:rPr lang="ru-RU" dirty="0" smtClean="0"/>
+              <a:t>Разбиение</a:t>
+            </a:r>
+          </a:p>
+          <a:p>
+            <a:pPr lvl="1">
+              <a:buNone/>
+            </a:pPr>
+            <a:r>
+              <a:rPr lang="en-US" dirty="0" smtClean="0"/>
+              <a:t>Ā</a:t>
+            </a:r>
+            <a:r>
+              <a:rPr lang="ru-RU" dirty="0" smtClean="0"/>
+              <a:t> </a:t>
+            </a:r>
+            <a:r>
+              <a:rPr lang="en-US" dirty="0" smtClean="0"/>
+              <a:t>→</a:t>
+            </a:r>
+            <a:r>
+              <a:rPr lang="ru-RU" dirty="0" smtClean="0"/>
+              <a:t> </a:t>
+            </a:r>
+            <a:r>
+              <a:rPr lang="en-US" dirty="0" smtClean="0"/>
+              <a:t>{E1, E2, …, </a:t>
+            </a:r>
+            <a:r>
+              <a:rPr lang="en-US" dirty="0" err="1" smtClean="0"/>
+              <a:t>Em</a:t>
+            </a:r>
+            <a:r>
+              <a:rPr lang="en-US" dirty="0" smtClean="0"/>
+              <a:t>} =&gt; </a:t>
+            </a:r>
+            <a:r>
+              <a:rPr lang="en-US" dirty="0" smtClean="0"/>
+              <a:t>Ā</a:t>
+            </a:r>
+            <a:r>
+              <a:rPr lang="ru-RU" dirty="0" smtClean="0"/>
+              <a:t> </a:t>
+            </a:r>
+            <a:r>
+              <a:rPr lang="en-US" dirty="0" smtClean="0"/>
+              <a:t>→</a:t>
+            </a:r>
+            <a:r>
+              <a:rPr lang="ru-RU" dirty="0" smtClean="0"/>
+              <a:t> </a:t>
+            </a:r>
+            <a:r>
+              <a:rPr lang="en-US" dirty="0" smtClean="0"/>
+              <a:t>E1</a:t>
+            </a:r>
+            <a:r>
+              <a:rPr lang="en-US" dirty="0" smtClean="0"/>
+              <a:t>, Ā</a:t>
+            </a:r>
+            <a:r>
+              <a:rPr lang="ru-RU" dirty="0" smtClean="0"/>
+              <a:t> </a:t>
+            </a:r>
+            <a:r>
+              <a:rPr lang="en-US" dirty="0" smtClean="0"/>
+              <a:t>→</a:t>
+            </a:r>
+            <a:r>
+              <a:rPr lang="ru-RU" dirty="0" smtClean="0"/>
+              <a:t> </a:t>
+            </a:r>
+            <a:r>
+              <a:rPr lang="en-US" dirty="0" smtClean="0"/>
+              <a:t>E2, …</a:t>
+            </a:r>
+          </a:p>
+          <a:p>
+            <a:pPr lvl="1">
+              <a:buNone/>
+            </a:pPr>
+            <a:r>
+              <a:rPr lang="ru-RU" dirty="0" smtClean="0"/>
+              <a:t>Можем ли мы разбить левую часть?</a:t>
+            </a:r>
+          </a:p>
+          <a:p>
+            <a:pPr lvl="1">
+              <a:buNone/>
+            </a:pPr>
+            <a:r>
+              <a:rPr lang="en-US" dirty="0" err="1" smtClean="0"/>
+              <a:t>HSname</a:t>
+            </a:r>
+            <a:r>
+              <a:rPr lang="en-US" dirty="0" smtClean="0"/>
+              <a:t>, </a:t>
+            </a:r>
+            <a:r>
+              <a:rPr lang="en-US" dirty="0" err="1" smtClean="0"/>
+              <a:t>HScity</a:t>
+            </a:r>
+            <a:r>
+              <a:rPr lang="en-US" dirty="0" smtClean="0"/>
+              <a:t> -&gt; </a:t>
+            </a:r>
+            <a:r>
+              <a:rPr lang="en-US" dirty="0" err="1" smtClean="0"/>
+              <a:t>Hscode</a:t>
+            </a:r>
+            <a:r>
+              <a:rPr lang="en-US" dirty="0" smtClean="0"/>
+              <a:t> =&gt; </a:t>
+            </a:r>
+            <a:r>
+              <a:rPr lang="en-US" dirty="0" err="1" smtClean="0"/>
+              <a:t>HSname</a:t>
+            </a:r>
+            <a:r>
+              <a:rPr lang="en-US" dirty="0" smtClean="0"/>
+              <a:t> -&gt; </a:t>
+            </a:r>
+            <a:r>
+              <a:rPr lang="en-US" dirty="0" err="1" smtClean="0"/>
+              <a:t>HScode</a:t>
+            </a:r>
+            <a:r>
+              <a:rPr lang="en-US" dirty="0" smtClean="0"/>
+              <a:t>, …</a:t>
+            </a:r>
+            <a:endParaRPr lang="ru-RU" dirty="0" smtClean="0"/>
+          </a:p>
+          <a:p>
+            <a:r>
+              <a:rPr lang="ru-RU" dirty="0" smtClean="0"/>
+              <a:t>Комбинирование</a:t>
+            </a:r>
+          </a:p>
+          <a:p>
+            <a:pPr marL="285750" lvl="1">
+              <a:buNone/>
+            </a:pPr>
+            <a:r>
+              <a:rPr lang="ru-RU" dirty="0" smtClean="0"/>
+              <a:t>	</a:t>
+            </a:r>
+            <a:r>
+              <a:rPr lang="ru-RU" dirty="0" smtClean="0"/>
+              <a:t>	</a:t>
+            </a:r>
+            <a:r>
+              <a:rPr lang="en-US" dirty="0" smtClean="0"/>
+              <a:t>Ā</a:t>
+            </a:r>
+            <a:r>
+              <a:rPr lang="ru-RU" dirty="0" smtClean="0"/>
+              <a:t> </a:t>
+            </a:r>
+            <a:r>
+              <a:rPr lang="en-US" dirty="0" smtClean="0"/>
+              <a:t>→</a:t>
+            </a:r>
+            <a:r>
+              <a:rPr lang="ru-RU" dirty="0" smtClean="0"/>
+              <a:t> </a:t>
+            </a:r>
+            <a:r>
+              <a:rPr lang="en-US" dirty="0" smtClean="0"/>
+              <a:t>E1</a:t>
+            </a:r>
+            <a:r>
+              <a:rPr lang="en-US" dirty="0" smtClean="0"/>
+              <a:t>, Ā</a:t>
+            </a:r>
+            <a:r>
+              <a:rPr lang="ru-RU" dirty="0" smtClean="0"/>
+              <a:t> </a:t>
+            </a:r>
+            <a:r>
+              <a:rPr lang="en-US" dirty="0" smtClean="0"/>
+              <a:t>→</a:t>
+            </a:r>
+            <a:r>
+              <a:rPr lang="ru-RU" dirty="0" smtClean="0"/>
+              <a:t> </a:t>
+            </a:r>
+            <a:r>
+              <a:rPr lang="en-US" dirty="0" smtClean="0"/>
+              <a:t>E</a:t>
+            </a:r>
+            <a:r>
+              <a:rPr lang="ru-RU" dirty="0" smtClean="0"/>
+              <a:t>2</a:t>
+            </a:r>
+            <a:r>
+              <a:rPr lang="en-US" dirty="0" smtClean="0"/>
+              <a:t>, Ā</a:t>
+            </a:r>
+            <a:r>
+              <a:rPr lang="ru-RU" dirty="0" smtClean="0"/>
+              <a:t> </a:t>
+            </a:r>
+            <a:r>
+              <a:rPr lang="en-US" dirty="0" smtClean="0"/>
+              <a:t>→</a:t>
+            </a:r>
+            <a:r>
+              <a:rPr lang="ru-RU" dirty="0" smtClean="0"/>
+              <a:t> </a:t>
+            </a:r>
+            <a:r>
+              <a:rPr lang="en-US" dirty="0" smtClean="0"/>
+              <a:t>E</a:t>
+            </a:r>
+            <a:r>
+              <a:rPr lang="ru-RU" dirty="0" smtClean="0"/>
+              <a:t>3</a:t>
+            </a:r>
+            <a:r>
+              <a:rPr lang="en-US" dirty="0" smtClean="0"/>
+              <a:t> </a:t>
+            </a:r>
+            <a:r>
+              <a:rPr lang="en-US" dirty="0" smtClean="0"/>
+              <a:t>=&gt; Ā</a:t>
+            </a:r>
+            <a:r>
+              <a:rPr lang="ru-RU" dirty="0" smtClean="0"/>
+              <a:t> </a:t>
+            </a:r>
+            <a:r>
+              <a:rPr lang="en-US" dirty="0" smtClean="0"/>
+              <a:t>→</a:t>
+            </a:r>
+            <a:r>
+              <a:rPr lang="ru-RU" dirty="0" smtClean="0"/>
+              <a:t> </a:t>
+            </a:r>
+            <a:r>
+              <a:rPr lang="en-US" dirty="0" smtClean="0"/>
+              <a:t>{E1</a:t>
+            </a:r>
+            <a:r>
+              <a:rPr lang="en-US" dirty="0" smtClean="0"/>
+              <a:t>, </a:t>
+            </a:r>
+            <a:r>
+              <a:rPr lang="en-US" dirty="0" smtClean="0"/>
+              <a:t>E2</a:t>
+            </a:r>
+            <a:r>
+              <a:rPr lang="en-US" dirty="0" smtClean="0"/>
+              <a:t>, </a:t>
+            </a:r>
+            <a:r>
+              <a:rPr lang="en-US" dirty="0" smtClean="0"/>
+              <a:t>E3</a:t>
+            </a:r>
+            <a:r>
+              <a:rPr lang="en-US" dirty="0" smtClean="0"/>
+              <a:t>}</a:t>
+            </a:r>
+          </a:p>
+          <a:p>
+            <a:r>
+              <a:rPr lang="ru-RU" dirty="0" smtClean="0"/>
+              <a:t>Тривиальная зависимость</a:t>
+            </a:r>
+          </a:p>
+          <a:p>
+            <a:pPr lvl="1">
+              <a:buNone/>
+            </a:pPr>
+            <a:r>
+              <a:rPr lang="en-US" dirty="0" smtClean="0"/>
+              <a:t>Ā</a:t>
+            </a:r>
+            <a:r>
+              <a:rPr lang="ru-RU" dirty="0" smtClean="0"/>
+              <a:t> </a:t>
+            </a:r>
+            <a:r>
+              <a:rPr lang="en-US" dirty="0" smtClean="0"/>
+              <a:t>→</a:t>
+            </a:r>
+            <a:r>
+              <a:rPr lang="ru-RU" dirty="0" smtClean="0"/>
+              <a:t> </a:t>
+            </a:r>
+            <a:r>
+              <a:rPr lang="en-US" dirty="0" smtClean="0"/>
+              <a:t>Ē, Ē </a:t>
+            </a:r>
+            <a:r>
+              <a:rPr lang="ru-RU" dirty="0" smtClean="0"/>
+              <a:t>подмножество </a:t>
+            </a:r>
+            <a:r>
+              <a:rPr lang="en-US" dirty="0" smtClean="0"/>
+              <a:t>Ā</a:t>
+            </a:r>
+            <a:endParaRPr lang="ru-RU" dirty="0" smtClean="0"/>
+          </a:p>
+          <a:p>
+            <a:pPr lvl="1">
+              <a:buNone/>
+            </a:pPr>
+            <a:r>
+              <a:rPr lang="en-US" dirty="0" smtClean="0"/>
+              <a:t>Ā</a:t>
+            </a:r>
+            <a:r>
+              <a:rPr lang="ru-RU" dirty="0" smtClean="0"/>
+              <a:t> </a:t>
+            </a:r>
+            <a:r>
+              <a:rPr lang="en-US" dirty="0" smtClean="0"/>
+              <a:t>→</a:t>
+            </a:r>
+            <a:r>
+              <a:rPr lang="ru-RU" dirty="0" smtClean="0"/>
+              <a:t> </a:t>
+            </a:r>
+            <a:r>
+              <a:rPr lang="en-US" dirty="0" smtClean="0"/>
+              <a:t>Ē </a:t>
+            </a:r>
+            <a:r>
+              <a:rPr lang="ru-RU" dirty="0" smtClean="0"/>
+              <a:t>=</a:t>
+            </a:r>
+            <a:r>
+              <a:rPr lang="en-US" dirty="0" smtClean="0"/>
+              <a:t>&gt; Ā</a:t>
+            </a:r>
+            <a:r>
+              <a:rPr lang="ru-RU" dirty="0" smtClean="0"/>
+              <a:t> </a:t>
+            </a:r>
+            <a:r>
+              <a:rPr lang="en-US" dirty="0" smtClean="0"/>
+              <a:t>→</a:t>
+            </a:r>
+            <a:r>
+              <a:rPr lang="ru-RU" dirty="0" smtClean="0"/>
+              <a:t> </a:t>
+            </a:r>
+            <a:r>
+              <a:rPr lang="en-US" dirty="0" smtClean="0"/>
+              <a:t>Ā </a:t>
+            </a:r>
+            <a:r>
+              <a:rPr lang="en-US" dirty="0" smtClean="0">
+                <a:sym typeface="Euclid Symbol"/>
+              </a:rPr>
+              <a:t> </a:t>
+            </a:r>
+            <a:r>
+              <a:rPr lang="en-US" dirty="0" smtClean="0"/>
+              <a:t>Ē</a:t>
+            </a:r>
+            <a:endParaRPr lang="ru-RU" dirty="0" smtClean="0"/>
+          </a:p>
+          <a:p>
+            <a:r>
+              <a:rPr lang="ru-RU" dirty="0" smtClean="0"/>
+              <a:t>Транзитивность</a:t>
+            </a:r>
+          </a:p>
+          <a:p>
+            <a:pPr lvl="1">
+              <a:buNone/>
+            </a:pPr>
+            <a:r>
+              <a:rPr lang="en-US" dirty="0" smtClean="0"/>
+              <a:t>Ā</a:t>
+            </a:r>
+            <a:r>
+              <a:rPr lang="ru-RU" dirty="0" smtClean="0"/>
+              <a:t> </a:t>
+            </a:r>
+            <a:r>
+              <a:rPr lang="en-US" dirty="0" smtClean="0"/>
+              <a:t>→</a:t>
+            </a:r>
+            <a:r>
+              <a:rPr lang="ru-RU" dirty="0" smtClean="0"/>
+              <a:t> </a:t>
+            </a:r>
+            <a:r>
+              <a:rPr lang="en-US" dirty="0" smtClean="0"/>
+              <a:t>Ē, Ē</a:t>
+            </a:r>
+            <a:r>
+              <a:rPr lang="en-US" dirty="0" smtClean="0"/>
+              <a:t> </a:t>
+            </a:r>
+            <a:r>
+              <a:rPr lang="en-US" dirty="0" smtClean="0"/>
+              <a:t>→</a:t>
+            </a:r>
+            <a:r>
+              <a:rPr lang="ru-RU" dirty="0" smtClean="0"/>
+              <a:t> </a:t>
+            </a:r>
+            <a:r>
+              <a:rPr lang="en-US" dirty="0" smtClean="0"/>
+              <a:t>Ō</a:t>
+            </a:r>
+            <a:r>
+              <a:rPr lang="en-US" dirty="0" smtClean="0"/>
+              <a:t> </a:t>
+            </a:r>
+            <a:r>
+              <a:rPr lang="en-US" dirty="0" smtClean="0"/>
+              <a:t>=&gt; Ā</a:t>
+            </a:r>
+            <a:r>
+              <a:rPr lang="ru-RU" dirty="0" smtClean="0"/>
+              <a:t> </a:t>
+            </a:r>
+            <a:r>
+              <a:rPr lang="en-US" dirty="0" smtClean="0"/>
+              <a:t>→</a:t>
+            </a:r>
+            <a:r>
+              <a:rPr lang="ru-RU" dirty="0" smtClean="0"/>
+              <a:t> </a:t>
+            </a:r>
+            <a:r>
+              <a:rPr lang="en-US" dirty="0" smtClean="0"/>
+              <a:t>Ō</a:t>
+            </a:r>
+            <a:endParaRPr lang="ru-RU" dirty="0" smtClean="0"/>
+          </a:p>
+        </p:txBody>
+      </p:sp>
+    </p:spTree>
+  </p:cSld>
+  <p:clrMapOvr>
+    <a:masterClrMapping/>
+  </p:clrMapOvr>
+  <p:timing>
+    <p:tnLst>
+      <p:par>
+        <p:cTn id="1" dur="indefinite" restart="never" nodeType="tmRoot"/>
+      </p:par>
+    </p:tnLst>
+  </p:timing>
+</p:sld>
+</file>
+
+<file path=ppt/slides/slide15.xml><?xml version="1.0" encoding="utf-8"?>
+<p:sld xmlns:a="http://schemas.openxmlformats.org/drawingml/2006/main" xmlns:r="http://schemas.openxmlformats.org/officeDocument/2006/relationships" xmlns:p="http://schemas.openxmlformats.org/presentationml/2006/main">
+  <p:cSld>
+    <p:spTree>
+      <p:nvGrpSpPr>
+        <p:cNvPr id="1" name=""/>
+        <p:cNvGrpSpPr/>
+        <p:nvPr/>
+      </p:nvGrpSpPr>
+      <p:grpSpPr>
+        <a:xfrm>
+          <a:off x="0" y="0"/>
+          <a:ext cx="0" cy="0"/>
+          <a:chOff x="0" y="0"/>
+          <a:chExt cx="0" cy="0"/>
+        </a:xfrm>
+      </p:grpSpPr>
+      <p:sp>
+        <p:nvSpPr>
+          <p:cNvPr id="2" name="Заголовок 1"/>
+          <p:cNvSpPr>
+            <a:spLocks noGrp="1"/>
+          </p:cNvSpPr>
+          <p:nvPr>
+            <p:ph type="title"/>
+          </p:nvPr>
+        </p:nvSpPr>
+        <p:spPr/>
+        <p:txBody>
+          <a:bodyPr/>
+          <a:lstStyle/>
+          <a:p>
+            <a:r>
+              <a:rPr lang="ru-RU" dirty="0" smtClean="0"/>
+              <a:t>Замыкание атрибутов</a:t>
+            </a:r>
+            <a:endParaRPr lang="ru-RU" dirty="0"/>
+          </a:p>
+        </p:txBody>
+      </p:sp>
+      <p:sp>
+        <p:nvSpPr>
+          <p:cNvPr id="3" name="Содержимое 2"/>
+          <p:cNvSpPr>
+            <a:spLocks noGrp="1"/>
+          </p:cNvSpPr>
+          <p:nvPr>
+            <p:ph idx="1"/>
+          </p:nvPr>
+        </p:nvSpPr>
+        <p:spPr/>
+        <p:txBody>
+          <a:bodyPr/>
+          <a:lstStyle/>
+          <a:p>
+            <a:r>
+              <a:rPr lang="ru-RU" dirty="0" smtClean="0"/>
+              <a:t>Задано отношение, функциональные зависимости, набор атрибутов </a:t>
+            </a:r>
+            <a:r>
+              <a:rPr lang="en-US" dirty="0" smtClean="0"/>
+              <a:t>Ā</a:t>
+            </a:r>
+            <a:endParaRPr lang="ru-RU" dirty="0" smtClean="0"/>
+          </a:p>
+          <a:p>
+            <a:r>
+              <a:rPr lang="ru-RU" dirty="0" smtClean="0"/>
+              <a:t>Найдем все </a:t>
+            </a:r>
+            <a:r>
+              <a:rPr lang="en-US" dirty="0" smtClean="0"/>
+              <a:t>E, </a:t>
+            </a:r>
+            <a:r>
+              <a:rPr lang="ru-RU" dirty="0" smtClean="0"/>
+              <a:t>такие что, </a:t>
+            </a:r>
+            <a:r>
+              <a:rPr lang="en-US" dirty="0" smtClean="0"/>
+              <a:t>Ā</a:t>
+            </a:r>
+            <a:r>
+              <a:rPr lang="en-US" dirty="0" smtClean="0"/>
+              <a:t> </a:t>
+            </a:r>
+            <a:r>
+              <a:rPr lang="en-US" dirty="0" smtClean="0"/>
+              <a:t>→</a:t>
+            </a:r>
+            <a:r>
+              <a:rPr lang="ru-RU" dirty="0" smtClean="0"/>
+              <a:t> </a:t>
+            </a:r>
+            <a:r>
+              <a:rPr lang="en-US" dirty="0" smtClean="0"/>
+              <a:t>E</a:t>
+            </a:r>
+            <a:endParaRPr lang="ru-RU" dirty="0" smtClean="0"/>
+          </a:p>
+          <a:p>
+            <a:r>
+              <a:rPr lang="ru-RU" dirty="0" smtClean="0"/>
+              <a:t>Добавим в </a:t>
+            </a:r>
+            <a:r>
+              <a:rPr lang="en-US" dirty="0" smtClean="0"/>
+              <a:t>Ā</a:t>
+            </a:r>
+            <a:r>
+              <a:rPr lang="ru-RU" dirty="0" smtClean="0"/>
+              <a:t>, если </a:t>
+            </a:r>
+            <a:r>
+              <a:rPr lang="en-US" dirty="0" smtClean="0"/>
+              <a:t>Ā </a:t>
+            </a:r>
+            <a:r>
+              <a:rPr lang="ru-RU" dirty="0" smtClean="0"/>
+              <a:t>изменилось, повторим пункт выше, иначе выход</a:t>
+            </a:r>
+          </a:p>
+          <a:p>
+            <a:pPr>
+              <a:buNone/>
+            </a:pPr>
+            <a:endParaRPr lang="en-US" dirty="0" smtClean="0"/>
+          </a:p>
+          <a:p>
+            <a:r>
+              <a:rPr lang="ru-RU" dirty="0" smtClean="0"/>
+              <a:t>Множество всех атрибутов, полученных таким образом, будут называться замыканием атрибутов </a:t>
+            </a:r>
+            <a:r>
+              <a:rPr lang="en-US" dirty="0" smtClean="0"/>
+              <a:t>Ā</a:t>
+            </a:r>
+            <a:r>
+              <a:rPr lang="ru-RU" dirty="0" smtClean="0"/>
+              <a:t>, обозначается это </a:t>
+            </a:r>
+            <a:r>
+              <a:rPr lang="en-US" dirty="0" smtClean="0"/>
+              <a:t>A+</a:t>
+            </a:r>
+            <a:endParaRPr lang="ru-RU" dirty="0"/>
+          </a:p>
+        </p:txBody>
+      </p:sp>
+    </p:spTree>
+  </p:cSld>
+  <p:clrMapOvr>
+    <a:masterClrMapping/>
+  </p:clrMapOvr>
+  <p:timing>
+    <p:tnLst>
+      <p:par>
+        <p:cTn id="1" dur="indefinite" restart="never" nodeType="tmRoot"/>
+      </p:par>
+    </p:tnLst>
+  </p:timing>
+</p:sld>
+</file>
+
+<file path=ppt/slides/slide16.xml><?xml version="1.0" encoding="utf-8"?>
+<p:sld xmlns:a="http://schemas.openxmlformats.org/drawingml/2006/main" xmlns:r="http://schemas.openxmlformats.org/officeDocument/2006/relationships" xmlns:p="http://schemas.openxmlformats.org/presentationml/2006/main">
+  <p:cSld>
+    <p:spTree>
+      <p:nvGrpSpPr>
+        <p:cNvPr id="1" name=""/>
+        <p:cNvGrpSpPr/>
+        <p:nvPr/>
+      </p:nvGrpSpPr>
+      <p:grpSpPr>
+        <a:xfrm>
+          <a:off x="0" y="0"/>
+          <a:ext cx="0" cy="0"/>
+          <a:chOff x="0" y="0"/>
+          <a:chExt cx="0" cy="0"/>
+        </a:xfrm>
+      </p:grpSpPr>
+      <p:sp>
+        <p:nvSpPr>
+          <p:cNvPr id="2" name="Заголовок 1"/>
+          <p:cNvSpPr>
+            <a:spLocks noGrp="1"/>
+          </p:cNvSpPr>
+          <p:nvPr>
+            <p:ph type="title"/>
+          </p:nvPr>
+        </p:nvSpPr>
+        <p:spPr/>
+        <p:txBody>
+          <a:bodyPr/>
+          <a:lstStyle/>
+          <a:p>
+            <a:r>
+              <a:rPr lang="ru-RU" dirty="0" smtClean="0"/>
+              <a:t>Пример замыкания</a:t>
+            </a:r>
+            <a:endParaRPr lang="ru-RU" dirty="0"/>
+          </a:p>
+        </p:txBody>
+      </p:sp>
+      <p:sp>
+        <p:nvSpPr>
+          <p:cNvPr id="3" name="Содержимое 2"/>
+          <p:cNvSpPr>
+            <a:spLocks noGrp="1"/>
+          </p:cNvSpPr>
+          <p:nvPr>
+            <p:ph idx="1"/>
+          </p:nvPr>
+        </p:nvSpPr>
+        <p:spPr/>
+        <p:txBody>
+          <a:bodyPr/>
+          <a:lstStyle/>
+          <a:p>
+            <a:pPr>
+              <a:buNone/>
+            </a:pPr>
+            <a:r>
+              <a:rPr lang="en-US" dirty="0" smtClean="0"/>
+              <a:t>Student(</a:t>
+            </a:r>
+            <a:r>
+              <a:rPr lang="en-US" dirty="0" err="1" smtClean="0"/>
+              <a:t>passID</a:t>
+            </a:r>
+            <a:r>
+              <a:rPr lang="en-US" dirty="0" smtClean="0"/>
+              <a:t>, </a:t>
+            </a:r>
+            <a:r>
+              <a:rPr lang="en-US" dirty="0" err="1" smtClean="0"/>
+              <a:t>sName</a:t>
+            </a:r>
+            <a:r>
+              <a:rPr lang="en-US" dirty="0" smtClean="0"/>
+              <a:t>, address, </a:t>
+            </a:r>
+            <a:r>
+              <a:rPr lang="en-US" dirty="0" err="1" smtClean="0"/>
+              <a:t>HScode</a:t>
+            </a:r>
+            <a:r>
+              <a:rPr lang="en-US" dirty="0" smtClean="0"/>
+              <a:t>, </a:t>
+            </a:r>
+            <a:r>
+              <a:rPr lang="en-US" dirty="0" err="1" smtClean="0"/>
+              <a:t>HSname</a:t>
+            </a:r>
+            <a:r>
+              <a:rPr lang="en-US" dirty="0" smtClean="0"/>
+              <a:t>, </a:t>
+            </a:r>
+            <a:r>
+              <a:rPr lang="en-US" dirty="0" err="1" smtClean="0"/>
+              <a:t>HScity</a:t>
+            </a:r>
+            <a:r>
+              <a:rPr lang="en-US" dirty="0" smtClean="0"/>
+              <a:t>, GPA, priority)</a:t>
+            </a:r>
+          </a:p>
+          <a:p>
+            <a:pPr>
+              <a:buNone/>
+            </a:pPr>
+            <a:endParaRPr lang="en-US" dirty="0" smtClean="0"/>
+          </a:p>
+          <a:p>
+            <a:pPr>
+              <a:buNone/>
+            </a:pPr>
+            <a:r>
+              <a:rPr lang="en-US" dirty="0" err="1" smtClean="0"/>
+              <a:t>passID</a:t>
+            </a:r>
+            <a:r>
+              <a:rPr lang="en-US" dirty="0" smtClean="0"/>
+              <a:t> </a:t>
+            </a:r>
+            <a:r>
+              <a:rPr lang="en-US" dirty="0" smtClean="0"/>
+              <a:t>→ </a:t>
+            </a:r>
+            <a:r>
+              <a:rPr lang="en-US" dirty="0" err="1" smtClean="0"/>
+              <a:t>sName</a:t>
+            </a:r>
+            <a:r>
+              <a:rPr lang="en-US" dirty="0" smtClean="0"/>
+              <a:t>, address, GPA</a:t>
+            </a:r>
+          </a:p>
+          <a:p>
+            <a:pPr>
+              <a:buNone/>
+            </a:pPr>
+            <a:r>
+              <a:rPr lang="en-US" dirty="0" smtClean="0"/>
+              <a:t>GPA</a:t>
+            </a:r>
+            <a:r>
+              <a:rPr lang="en-US" dirty="0" smtClean="0"/>
+              <a:t> </a:t>
+            </a:r>
+            <a:r>
+              <a:rPr lang="en-US" dirty="0" smtClean="0"/>
+              <a:t>→ priority</a:t>
+            </a:r>
+          </a:p>
+          <a:p>
+            <a:pPr>
+              <a:buNone/>
+            </a:pPr>
+            <a:r>
+              <a:rPr lang="en-US" dirty="0" err="1" smtClean="0"/>
+              <a:t>HScode</a:t>
+            </a:r>
+            <a:r>
+              <a:rPr lang="en-US" dirty="0" smtClean="0"/>
+              <a:t> </a:t>
+            </a:r>
+            <a:r>
+              <a:rPr lang="en-US" dirty="0" smtClean="0"/>
+              <a:t>→ </a:t>
+            </a:r>
+            <a:r>
+              <a:rPr lang="en-US" dirty="0" err="1" smtClean="0"/>
+              <a:t>HSname</a:t>
+            </a:r>
+            <a:r>
+              <a:rPr lang="en-US" dirty="0" smtClean="0"/>
+              <a:t>, </a:t>
+            </a:r>
+            <a:r>
+              <a:rPr lang="en-US" dirty="0" err="1" smtClean="0"/>
+              <a:t>HScity</a:t>
+            </a:r>
+            <a:endParaRPr lang="en-US" dirty="0" smtClean="0"/>
+          </a:p>
+          <a:p>
+            <a:pPr>
+              <a:buNone/>
+            </a:pPr>
+            <a:endParaRPr lang="en-US" dirty="0" smtClean="0"/>
+          </a:p>
+          <a:p>
+            <a:pPr>
+              <a:buNone/>
+            </a:pPr>
+            <a:r>
+              <a:rPr lang="en-US" dirty="0" smtClean="0"/>
+              <a:t>{</a:t>
+            </a:r>
+            <a:r>
+              <a:rPr lang="en-US" dirty="0" err="1" smtClean="0"/>
+              <a:t>passID</a:t>
+            </a:r>
+            <a:r>
+              <a:rPr lang="en-US" dirty="0" smtClean="0"/>
+              <a:t>, </a:t>
+            </a:r>
+            <a:r>
+              <a:rPr lang="en-US" dirty="0" err="1" smtClean="0"/>
+              <a:t>HScode</a:t>
+            </a:r>
+            <a:r>
+              <a:rPr lang="en-US" dirty="0" smtClean="0"/>
+              <a:t>}+</a:t>
+            </a:r>
+          </a:p>
+          <a:p>
+            <a:pPr>
+              <a:buNone/>
+            </a:pPr>
+            <a:r>
+              <a:rPr lang="en-US" dirty="0" smtClean="0"/>
+              <a:t>{</a:t>
+            </a:r>
+            <a:r>
+              <a:rPr lang="en-US" dirty="0" err="1" smtClean="0"/>
+              <a:t>passID</a:t>
+            </a:r>
+            <a:r>
+              <a:rPr lang="en-US" dirty="0" smtClean="0"/>
+              <a:t>, </a:t>
+            </a:r>
+            <a:r>
+              <a:rPr lang="en-US" dirty="0" err="1" smtClean="0"/>
+              <a:t>HScode</a:t>
+            </a:r>
+            <a:r>
+              <a:rPr lang="en-US" dirty="0" smtClean="0"/>
+              <a:t>, </a:t>
+            </a:r>
+            <a:r>
+              <a:rPr lang="en-US" dirty="0" err="1" smtClean="0"/>
+              <a:t>sName</a:t>
+            </a:r>
+            <a:r>
+              <a:rPr lang="en-US" dirty="0" smtClean="0"/>
+              <a:t>, address, GPA, </a:t>
+            </a:r>
+            <a:r>
+              <a:rPr lang="en-US" dirty="0" err="1" smtClean="0"/>
+              <a:t>HSname</a:t>
+            </a:r>
+            <a:r>
+              <a:rPr lang="en-US" dirty="0" smtClean="0"/>
+              <a:t>, </a:t>
+            </a:r>
+            <a:r>
+              <a:rPr lang="en-US" dirty="0" err="1" smtClean="0"/>
+              <a:t>HScity</a:t>
+            </a:r>
+            <a:r>
+              <a:rPr lang="en-US" dirty="0" smtClean="0"/>
+              <a:t>}</a:t>
+            </a:r>
+          </a:p>
+          <a:p>
+            <a:pPr>
+              <a:buNone/>
+            </a:pPr>
+            <a:r>
+              <a:rPr lang="en-US" dirty="0" smtClean="0"/>
+              <a:t>{</a:t>
+            </a:r>
+            <a:r>
+              <a:rPr lang="en-US" dirty="0" err="1" smtClean="0"/>
+              <a:t>passID</a:t>
+            </a:r>
+            <a:r>
+              <a:rPr lang="en-US" dirty="0" smtClean="0"/>
+              <a:t>, </a:t>
+            </a:r>
+            <a:r>
+              <a:rPr lang="en-US" dirty="0" err="1" smtClean="0"/>
+              <a:t>HScode</a:t>
+            </a:r>
+            <a:r>
+              <a:rPr lang="en-US" dirty="0" smtClean="0"/>
+              <a:t>, </a:t>
+            </a:r>
+            <a:r>
+              <a:rPr lang="en-US" dirty="0" err="1" smtClean="0"/>
+              <a:t>sName</a:t>
+            </a:r>
+            <a:r>
+              <a:rPr lang="en-US" dirty="0" smtClean="0"/>
+              <a:t>, address, GPA, </a:t>
+            </a:r>
+            <a:r>
+              <a:rPr lang="en-US" dirty="0" err="1" smtClean="0"/>
+              <a:t>HSname</a:t>
+            </a:r>
+            <a:r>
+              <a:rPr lang="en-US" dirty="0" smtClean="0"/>
+              <a:t>, </a:t>
+            </a:r>
+            <a:r>
+              <a:rPr lang="en-US" dirty="0" err="1" smtClean="0"/>
+              <a:t>Hscity</a:t>
+            </a:r>
+            <a:r>
+              <a:rPr lang="en-US" dirty="0" smtClean="0"/>
+              <a:t>, priority}</a:t>
+            </a:r>
+            <a:endParaRPr lang="ru-RU" dirty="0" smtClean="0"/>
+          </a:p>
+        </p:txBody>
+      </p:sp>
+    </p:spTree>
+  </p:cSld>
+  <p:clrMapOvr>
+    <a:masterClrMapping/>
+  </p:clrMapOvr>
+  <p:timing>
+    <p:tnLst>
+      <p:par>
+        <p:cTn id="1" dur="indefinite" restart="never" nodeType="tmRoot"/>
+      </p:par>
+    </p:tnLst>
+  </p:timing>
+</p:sld>
+</file>
+
+<file path=ppt/slides/slide17.xml><?xml version="1.0" encoding="utf-8"?>
+<p:sld xmlns:a="http://schemas.openxmlformats.org/drawingml/2006/main" xmlns:r="http://schemas.openxmlformats.org/officeDocument/2006/relationships" xmlns:p="http://schemas.openxmlformats.org/presentationml/2006/main">
+  <p:cSld>
+    <p:spTree>
+      <p:nvGrpSpPr>
+        <p:cNvPr id="1" name=""/>
+        <p:cNvGrpSpPr/>
+        <p:nvPr/>
+      </p:nvGrpSpPr>
+      <p:grpSpPr>
+        <a:xfrm>
+          <a:off x="0" y="0"/>
+          <a:ext cx="0" cy="0"/>
+          <a:chOff x="0" y="0"/>
+          <a:chExt cx="0" cy="0"/>
+        </a:xfrm>
+      </p:grpSpPr>
+      <p:sp>
+        <p:nvSpPr>
+          <p:cNvPr id="2" name="Заголовок 1"/>
+          <p:cNvSpPr>
+            <a:spLocks noGrp="1"/>
+          </p:cNvSpPr>
+          <p:nvPr>
+            <p:ph type="title"/>
+          </p:nvPr>
+        </p:nvSpPr>
+        <p:spPr/>
+        <p:txBody>
+          <a:bodyPr/>
+          <a:lstStyle/>
+          <a:p>
+            <a:r>
+              <a:rPr lang="ru-RU" dirty="0" smtClean="0"/>
+              <a:t>Замыкание и ключи</a:t>
+            </a:r>
+            <a:endParaRPr lang="ru-RU" dirty="0"/>
+          </a:p>
+        </p:txBody>
+      </p:sp>
+      <p:sp>
+        <p:nvSpPr>
+          <p:cNvPr id="3" name="Содержимое 2"/>
+          <p:cNvSpPr>
+            <a:spLocks noGrp="1"/>
+          </p:cNvSpPr>
+          <p:nvPr>
+            <p:ph idx="1"/>
+          </p:nvPr>
+        </p:nvSpPr>
+        <p:spPr/>
+        <p:txBody>
+          <a:bodyPr/>
+          <a:lstStyle/>
+          <a:p>
+            <a:pPr>
+              <a:buNone/>
+            </a:pPr>
+            <a:r>
+              <a:rPr lang="ru-RU" b="1" dirty="0" smtClean="0"/>
+              <a:t>Является ли </a:t>
+            </a:r>
+            <a:r>
+              <a:rPr lang="en-US" b="1" dirty="0" smtClean="0"/>
+              <a:t>Ā</a:t>
+            </a:r>
+            <a:r>
+              <a:rPr lang="ru-RU" b="1" dirty="0" smtClean="0"/>
+              <a:t> – ключом для отношения </a:t>
+            </a:r>
+            <a:r>
+              <a:rPr lang="en-US" b="1" dirty="0" smtClean="0"/>
+              <a:t>R?</a:t>
+            </a:r>
+          </a:p>
+          <a:p>
+            <a:pPr>
+              <a:buNone/>
+            </a:pPr>
+            <a:r>
+              <a:rPr lang="ru-RU" dirty="0" smtClean="0"/>
+              <a:t>Вычисляем замыкание </a:t>
+            </a:r>
+            <a:r>
+              <a:rPr lang="en-US" dirty="0" smtClean="0"/>
+              <a:t>A+, </a:t>
+            </a:r>
+            <a:r>
+              <a:rPr lang="ru-RU" dirty="0" smtClean="0"/>
+              <a:t>если оно совпадает с набором всех атрибутов, то </a:t>
+            </a:r>
+            <a:r>
+              <a:rPr lang="en-US" dirty="0" smtClean="0"/>
+              <a:t>Ā</a:t>
+            </a:r>
+            <a:r>
+              <a:rPr lang="ru-RU" dirty="0" smtClean="0"/>
+              <a:t> является ключом.</a:t>
+            </a:r>
+          </a:p>
+          <a:p>
+            <a:pPr>
+              <a:buNone/>
+            </a:pPr>
+            <a:endParaRPr lang="ru-RU" dirty="0" smtClean="0"/>
+          </a:p>
+          <a:p>
+            <a:pPr>
+              <a:buNone/>
+            </a:pPr>
+            <a:r>
+              <a:rPr lang="ru-RU" b="1" dirty="0" smtClean="0"/>
+              <a:t>Как найти все ключи для заданного набора функциональных зависимостей?</a:t>
+            </a:r>
+          </a:p>
+          <a:p>
+            <a:pPr>
+              <a:buNone/>
+            </a:pPr>
+            <a:r>
+              <a:rPr lang="ru-RU" dirty="0" smtClean="0"/>
+              <a:t>Рассмотрим каждое подмножество атрибутов, начиная с самого малого и получим </a:t>
+            </a:r>
+            <a:r>
+              <a:rPr lang="ru-RU" dirty="0" err="1" smtClean="0"/>
+              <a:t>тразитивное</a:t>
+            </a:r>
+            <a:r>
+              <a:rPr lang="ru-RU" dirty="0" smtClean="0"/>
+              <a:t> замыкание для него.</a:t>
+            </a:r>
+          </a:p>
+          <a:p>
+            <a:pPr>
+              <a:buNone/>
+            </a:pPr>
+            <a:r>
+              <a:rPr lang="ru-RU" dirty="0" smtClean="0"/>
+              <a:t>	</a:t>
+            </a:r>
+            <a:r>
+              <a:rPr lang="ru-RU" dirty="0" smtClean="0"/>
+              <a:t>Из </a:t>
+            </a:r>
+            <a:r>
+              <a:rPr lang="en-US" dirty="0" smtClean="0"/>
+              <a:t>Ā </a:t>
+            </a:r>
+            <a:r>
+              <a:rPr lang="ru-RU" dirty="0" smtClean="0"/>
+              <a:t>получаем </a:t>
+            </a:r>
+            <a:r>
+              <a:rPr lang="en-US" dirty="0" smtClean="0"/>
+              <a:t>A</a:t>
+            </a:r>
+            <a:r>
+              <a:rPr lang="en-US" dirty="0" smtClean="0"/>
+              <a:t>+</a:t>
+            </a:r>
+            <a:r>
+              <a:rPr lang="ru-RU" dirty="0" smtClean="0"/>
+              <a:t>, проверяем, совпадает ли </a:t>
+            </a:r>
+            <a:r>
+              <a:rPr lang="en-US" dirty="0" smtClean="0"/>
+              <a:t>A+ </a:t>
+            </a:r>
+            <a:r>
+              <a:rPr lang="ru-RU" dirty="0" smtClean="0"/>
+              <a:t>с множеством всех атрибутов. Если да, то </a:t>
+            </a:r>
+            <a:r>
+              <a:rPr lang="en-US" dirty="0" smtClean="0"/>
+              <a:t>Ā – </a:t>
+            </a:r>
+            <a:r>
+              <a:rPr lang="ru-RU" dirty="0" smtClean="0"/>
+              <a:t>ключ.</a:t>
+            </a:r>
+            <a:endParaRPr lang="ru-RU" dirty="0"/>
+          </a:p>
+        </p:txBody>
+      </p:sp>
+    </p:spTree>
+  </p:cSld>
+  <p:clrMapOvr>
+    <a:masterClrMapping/>
+  </p:clrMapOvr>
+  <p:timing>
+    <p:tnLst>
+      <p:par>
+        <p:cTn id="1" dur="indefinite" restart="never" nodeType="tmRoot"/>
+      </p:par>
+    </p:tnLst>
+  </p:timing>
+</p:sld>
+</file>
+
+<file path=ppt/slides/slide18.xml><?xml version="1.0" encoding="utf-8"?>
+<p:sld xmlns:a="http://schemas.openxmlformats.org/drawingml/2006/main" xmlns:r="http://schemas.openxmlformats.org/officeDocument/2006/relationships" xmlns:p="http://schemas.openxmlformats.org/presentationml/2006/main">
+  <p:cSld>
+    <p:spTree>
+      <p:nvGrpSpPr>
+        <p:cNvPr id="1" name=""/>
+        <p:cNvGrpSpPr/>
+        <p:nvPr/>
+      </p:nvGrpSpPr>
+      <p:grpSpPr>
+        <a:xfrm>
+          <a:off x="0" y="0"/>
+          <a:ext cx="0" cy="0"/>
+          <a:chOff x="0" y="0"/>
+          <a:chExt cx="0" cy="0"/>
+        </a:xfrm>
+      </p:grpSpPr>
+      <p:sp>
+        <p:nvSpPr>
+          <p:cNvPr id="2" name="Заголовок 1"/>
+          <p:cNvSpPr>
+            <a:spLocks noGrp="1"/>
+          </p:cNvSpPr>
+          <p:nvPr>
+            <p:ph type="title"/>
+          </p:nvPr>
+        </p:nvSpPr>
+        <p:spPr/>
+        <p:txBody>
+          <a:bodyPr/>
+          <a:lstStyle/>
+          <a:p>
+            <a:r>
+              <a:rPr lang="ru-RU" dirty="0" smtClean="0"/>
+              <a:t>вопрос</a:t>
+            </a:r>
+            <a:endParaRPr lang="ru-RU" dirty="0"/>
+          </a:p>
+        </p:txBody>
+      </p:sp>
+      <p:sp>
+        <p:nvSpPr>
+          <p:cNvPr id="3" name="Содержимое 2"/>
+          <p:cNvSpPr>
+            <a:spLocks noGrp="1"/>
+          </p:cNvSpPr>
+          <p:nvPr>
+            <p:ph idx="1"/>
+          </p:nvPr>
+        </p:nvSpPr>
+        <p:spPr>
+          <a:xfrm>
+            <a:off x="818347" y="1916482"/>
+            <a:ext cx="7736929" cy="4359058"/>
+          </a:xfrm>
+        </p:spPr>
+        <p:txBody>
+          <a:bodyPr>
+            <a:normAutofit/>
+          </a:bodyPr>
+          <a:lstStyle/>
+          <a:p>
+            <a:pPr>
+              <a:buNone/>
+            </a:pPr>
+            <a:r>
+              <a:rPr lang="ru-RU" dirty="0" smtClean="0"/>
+              <a:t>Рассмотрим отношение </a:t>
+            </a:r>
+            <a:r>
+              <a:rPr lang="en-US" dirty="0" smtClean="0"/>
+              <a:t>R(A,B,C,D,E) </a:t>
+            </a:r>
+            <a:r>
+              <a:rPr lang="ru-RU" dirty="0" smtClean="0"/>
+              <a:t>и предположим, что у нас имеются следующие функциональные зависимости:</a:t>
+            </a:r>
+          </a:p>
+          <a:p>
+            <a:pPr>
+              <a:buNone/>
+            </a:pPr>
+            <a:r>
+              <a:rPr lang="en-US" dirty="0" smtClean="0"/>
+              <a:t>AB</a:t>
+            </a:r>
+            <a:r>
+              <a:rPr lang="en-US" dirty="0" smtClean="0"/>
+              <a:t> </a:t>
+            </a:r>
+            <a:r>
+              <a:rPr lang="en-US" dirty="0" smtClean="0"/>
+              <a:t>→ C</a:t>
+            </a:r>
+          </a:p>
+          <a:p>
+            <a:pPr>
+              <a:buNone/>
+            </a:pPr>
+            <a:r>
+              <a:rPr lang="en-US" dirty="0" smtClean="0"/>
+              <a:t>AE</a:t>
+            </a:r>
+            <a:r>
+              <a:rPr lang="en-US" dirty="0" smtClean="0"/>
+              <a:t> </a:t>
+            </a:r>
+            <a:r>
+              <a:rPr lang="en-US" dirty="0" smtClean="0"/>
+              <a:t>→ D</a:t>
+            </a:r>
+          </a:p>
+          <a:p>
+            <a:pPr>
+              <a:buNone/>
+            </a:pPr>
+            <a:r>
+              <a:rPr lang="en-US" dirty="0" smtClean="0"/>
+              <a:t>D</a:t>
+            </a:r>
+            <a:r>
+              <a:rPr lang="en-US" dirty="0" smtClean="0"/>
+              <a:t> </a:t>
+            </a:r>
+            <a:r>
+              <a:rPr lang="en-US" dirty="0" smtClean="0"/>
+              <a:t>→ B</a:t>
+            </a:r>
+          </a:p>
+          <a:p>
+            <a:pPr>
+              <a:buNone/>
+            </a:pPr>
+            <a:endParaRPr lang="en-US" dirty="0" smtClean="0"/>
+          </a:p>
+          <a:p>
+            <a:pPr>
+              <a:buNone/>
+            </a:pPr>
+            <a:r>
+              <a:rPr lang="ru-RU" dirty="0" smtClean="0"/>
+              <a:t>Какая из следующих пар атрибутов является ключом для отношения</a:t>
+            </a:r>
+            <a:r>
+              <a:rPr lang="en-US" dirty="0" smtClean="0"/>
+              <a:t> R</a:t>
+            </a:r>
+          </a:p>
+          <a:p>
+            <a:pPr>
+              <a:buNone/>
+            </a:pPr>
+            <a:r>
+              <a:rPr lang="en-US" dirty="0" smtClean="0"/>
+              <a:t>AB</a:t>
+            </a:r>
+          </a:p>
+          <a:p>
+            <a:pPr>
+              <a:buNone/>
+            </a:pPr>
+            <a:r>
+              <a:rPr lang="en-US" dirty="0" smtClean="0"/>
+              <a:t>AC</a:t>
+            </a:r>
+          </a:p>
+          <a:p>
+            <a:pPr>
+              <a:buNone/>
+            </a:pPr>
+            <a:r>
+              <a:rPr lang="en-US" dirty="0" smtClean="0"/>
+              <a:t>AD</a:t>
+            </a:r>
+          </a:p>
+          <a:p>
+            <a:pPr>
+              <a:buNone/>
+            </a:pPr>
+            <a:r>
+              <a:rPr lang="en-US" dirty="0" smtClean="0"/>
+              <a:t>AE</a:t>
+            </a:r>
+            <a:endParaRPr lang="ru-RU" dirty="0"/>
+          </a:p>
+        </p:txBody>
+      </p:sp>
+    </p:spTree>
+  </p:cSld>
+  <p:clrMapOvr>
+    <a:masterClrMapping/>
+  </p:clrMapOvr>
+  <p:timing>
+    <p:tnLst>
+      <p:par>
+        <p:cTn id="1" dur="indefinite" restart="never" nodeType="tmRoot"/>
+      </p:par>
+    </p:tnLst>
+  </p:timing>
+</p:sld>
+</file>
+
+<file path=ppt/slides/slide19.xml><?xml version="1.0" encoding="utf-8"?>
+<p:sld xmlns:a="http://schemas.openxmlformats.org/drawingml/2006/main" xmlns:r="http://schemas.openxmlformats.org/officeDocument/2006/relationships" xmlns:p="http://schemas.openxmlformats.org/presentationml/2006/main">
+  <p:cSld>
+    <p:spTree>
+      <p:nvGrpSpPr>
+        <p:cNvPr id="1" name=""/>
+        <p:cNvGrpSpPr/>
+        <p:nvPr/>
+      </p:nvGrpSpPr>
+      <p:grpSpPr>
+        <a:xfrm>
+          <a:off x="0" y="0"/>
+          <a:ext cx="0" cy="0"/>
+          <a:chOff x="0" y="0"/>
+          <a:chExt cx="0" cy="0"/>
+        </a:xfrm>
+      </p:grpSpPr>
+      <p:sp>
+        <p:nvSpPr>
+          <p:cNvPr id="2" name="Заголовок 1"/>
+          <p:cNvSpPr>
+            <a:spLocks noGrp="1"/>
+          </p:cNvSpPr>
+          <p:nvPr>
+            <p:ph type="title"/>
+          </p:nvPr>
+        </p:nvSpPr>
+        <p:spPr/>
+        <p:txBody>
+          <a:bodyPr/>
+          <a:lstStyle/>
+          <a:p>
+            <a:r>
+              <a:rPr lang="ru-RU" dirty="0" smtClean="0"/>
+              <a:t>Определение функциональной зависимости для отношения</a:t>
+            </a:r>
+            <a:endParaRPr lang="ru-RU" dirty="0"/>
+          </a:p>
+        </p:txBody>
+      </p:sp>
+      <p:sp>
+        <p:nvSpPr>
+          <p:cNvPr id="3" name="Содержимое 2"/>
+          <p:cNvSpPr>
+            <a:spLocks noGrp="1"/>
+          </p:cNvSpPr>
+          <p:nvPr>
+            <p:ph idx="1"/>
+          </p:nvPr>
+        </p:nvSpPr>
+        <p:spPr/>
+        <p:txBody>
+          <a:bodyPr>
+            <a:normAutofit/>
+          </a:bodyPr>
+          <a:lstStyle/>
+          <a:p>
+            <a:r>
+              <a:rPr lang="en-US" dirty="0" smtClean="0"/>
+              <a:t>S1 </a:t>
+            </a:r>
+            <a:r>
+              <a:rPr lang="ru-RU" dirty="0" smtClean="0"/>
+              <a:t>и </a:t>
+            </a:r>
+            <a:r>
+              <a:rPr lang="en-US" dirty="0" smtClean="0"/>
+              <a:t>S2 – </a:t>
+            </a:r>
+            <a:r>
+              <a:rPr lang="ru-RU" dirty="0" smtClean="0"/>
+              <a:t>множества функциональных зависимостей</a:t>
+            </a:r>
+          </a:p>
+          <a:p>
+            <a:r>
+              <a:rPr lang="en-US" dirty="0" smtClean="0"/>
+              <a:t>S2 </a:t>
+            </a:r>
+            <a:r>
+              <a:rPr lang="ru-RU" dirty="0" smtClean="0"/>
+              <a:t>следует из </a:t>
+            </a:r>
+            <a:r>
+              <a:rPr lang="en-US" dirty="0" smtClean="0"/>
+              <a:t>S1, </a:t>
+            </a:r>
+            <a:r>
+              <a:rPr lang="ru-RU" dirty="0" smtClean="0"/>
+              <a:t>если каждый экземпляр отношения, удовлетворяющий </a:t>
+            </a:r>
+            <a:r>
+              <a:rPr lang="en-US" dirty="0" smtClean="0"/>
+              <a:t>S1, </a:t>
+            </a:r>
+            <a:r>
+              <a:rPr lang="ru-RU" dirty="0" smtClean="0"/>
+              <a:t>также удовлетворяет и </a:t>
+            </a:r>
+            <a:r>
+              <a:rPr lang="en-US" dirty="0" smtClean="0"/>
+              <a:t>S2</a:t>
+            </a:r>
+          </a:p>
+          <a:p>
+            <a:pPr>
+              <a:buNone/>
+            </a:pPr>
+            <a:endParaRPr lang="en-US" dirty="0" smtClean="0"/>
+          </a:p>
+          <a:p>
+            <a:pPr algn="ctr">
+              <a:buNone/>
+            </a:pPr>
+            <a:r>
+              <a:rPr lang="en-US" dirty="0" smtClean="0"/>
+              <a:t>S2: {</a:t>
+            </a:r>
+            <a:r>
+              <a:rPr lang="en-US" dirty="0" err="1" smtClean="0"/>
+              <a:t>passID</a:t>
+            </a:r>
+            <a:r>
+              <a:rPr lang="en-US" dirty="0" smtClean="0"/>
+              <a:t> → priority}</a:t>
+            </a:r>
+          </a:p>
+          <a:p>
+            <a:pPr algn="ctr">
+              <a:buNone/>
+            </a:pPr>
+            <a:r>
+              <a:rPr lang="en-US" dirty="0" smtClean="0"/>
+              <a:t>S1: {</a:t>
+            </a:r>
+            <a:r>
+              <a:rPr lang="en-US" dirty="0" err="1" smtClean="0"/>
+              <a:t>passID</a:t>
+            </a:r>
+            <a:r>
+              <a:rPr lang="en-US" dirty="0" smtClean="0"/>
+              <a:t> </a:t>
+            </a:r>
+            <a:r>
+              <a:rPr lang="en-US" dirty="0" smtClean="0"/>
+              <a:t>→ GPA, GPA → priority}</a:t>
+            </a:r>
+            <a:endParaRPr lang="ru-RU" dirty="0" smtClean="0"/>
+          </a:p>
+          <a:p>
+            <a:pPr algn="ctr">
+              <a:buNone/>
+            </a:pPr>
+            <a:endParaRPr lang="en-US" dirty="0" smtClean="0"/>
+          </a:p>
+          <a:p>
+            <a:pPr>
+              <a:buFont typeface="Arial" charset="0"/>
+              <a:buChar char="•"/>
+            </a:pPr>
+            <a:r>
+              <a:rPr lang="ru-RU" dirty="0" smtClean="0"/>
+              <a:t>Как </a:t>
+            </a:r>
+            <a:r>
+              <a:rPr lang="ru-RU" dirty="0" smtClean="0"/>
+              <a:t>проверить, что </a:t>
+            </a:r>
+            <a:r>
+              <a:rPr lang="en-US" dirty="0" smtClean="0"/>
+              <a:t>Ā →</a:t>
+            </a:r>
+            <a:r>
+              <a:rPr lang="ru-RU" dirty="0" smtClean="0"/>
+              <a:t> </a:t>
+            </a:r>
+            <a:r>
+              <a:rPr lang="en-US" dirty="0" smtClean="0"/>
+              <a:t>Ē</a:t>
+            </a:r>
+            <a:r>
+              <a:rPr lang="en-US" dirty="0" smtClean="0"/>
+              <a:t> </a:t>
+            </a:r>
+            <a:r>
+              <a:rPr lang="ru-RU" dirty="0" smtClean="0"/>
+              <a:t>следует из </a:t>
+            </a:r>
+            <a:r>
+              <a:rPr lang="en-US" dirty="0" smtClean="0"/>
+              <a:t>S</a:t>
+            </a:r>
+            <a:r>
+              <a:rPr lang="en-US" dirty="0" smtClean="0"/>
+              <a:t>?</a:t>
+            </a:r>
+            <a:endParaRPr lang="ru-RU" dirty="0" smtClean="0"/>
+          </a:p>
+          <a:p>
+            <a:pPr lvl="1">
+              <a:buFont typeface="Arial" charset="0"/>
+              <a:buChar char="•"/>
+            </a:pPr>
+            <a:r>
+              <a:rPr lang="ru-RU" dirty="0" smtClean="0"/>
+              <a:t>Вычисляем </a:t>
+            </a:r>
+            <a:r>
+              <a:rPr lang="en-US" dirty="0" smtClean="0"/>
+              <a:t>Ā+ </a:t>
+            </a:r>
+            <a:r>
+              <a:rPr lang="ru-RU" dirty="0" smtClean="0"/>
+              <a:t>на основе </a:t>
+            </a:r>
+            <a:r>
+              <a:rPr lang="en-US" dirty="0" smtClean="0"/>
+              <a:t>S, </a:t>
+            </a:r>
+            <a:r>
+              <a:rPr lang="ru-RU" dirty="0" smtClean="0"/>
+              <a:t>и проверяем, входит ли </a:t>
+            </a:r>
+            <a:r>
+              <a:rPr lang="en-US" dirty="0" smtClean="0"/>
+              <a:t>Ē </a:t>
+            </a:r>
+            <a:r>
+              <a:rPr lang="ru-RU" dirty="0" smtClean="0"/>
+              <a:t>в множество </a:t>
+            </a:r>
+            <a:r>
+              <a:rPr lang="en-US" dirty="0" smtClean="0"/>
+              <a:t>Ā</a:t>
+            </a:r>
+          </a:p>
+          <a:p>
+            <a:pPr lvl="1">
+              <a:buFont typeface="Arial" charset="0"/>
+              <a:buChar char="•"/>
+            </a:pPr>
+            <a:r>
+              <a:rPr lang="ru-RU" dirty="0" smtClean="0"/>
+              <a:t>Либо используем аксиомы </a:t>
+            </a:r>
+            <a:r>
+              <a:rPr lang="ru-RU" dirty="0" err="1" smtClean="0"/>
+              <a:t>Армстронга</a:t>
+            </a:r>
+            <a:r>
+              <a:rPr lang="ru-RU" dirty="0" smtClean="0"/>
+              <a:t> (читать самим)</a:t>
+            </a:r>
+          </a:p>
+        </p:txBody>
+      </p:sp>
+    </p:spTree>
   </p:cSld>
   <p:clrMapOvr>
     <a:masterClrMapping/>
@@ -6502,7 +8811,6 @@
               <a:rPr lang="ru-RU" dirty="0" smtClean="0"/>
               <a:t>.</a:t>
             </a:r>
-            <a:endParaRPr lang="ru-RU" dirty="0" smtClean="0"/>
           </a:p>
           <a:p>
             <a:r>
@@ -6573,13 +8881,244 @@
             </a:pPr>
             <a:r>
               <a:rPr lang="ru-RU" dirty="0" smtClean="0"/>
-              <a:t>Оптимизация запросо</a:t>
-            </a:r>
-            <a:r>
-              <a:rPr lang="ru-RU" dirty="0" smtClean="0"/>
-              <a:t>в.</a:t>
-            </a:r>
-            <a:endParaRPr lang="ru-RU" dirty="0" smtClean="0"/>
+              <a:t>Оптимизация запросов.</a:t>
+            </a:r>
+          </a:p>
+        </p:txBody>
+      </p:sp>
+    </p:spTree>
+  </p:cSld>
+  <p:clrMapOvr>
+    <a:masterClrMapping/>
+  </p:clrMapOvr>
+  <p:timing>
+    <p:tnLst>
+      <p:par>
+        <p:cTn id="1" dur="indefinite" restart="never" nodeType="tmRoot"/>
+      </p:par>
+    </p:tnLst>
+  </p:timing>
+</p:sld>
+</file>
+
+<file path=ppt/slides/slide20.xml><?xml version="1.0" encoding="utf-8"?>
+<p:sld xmlns:a="http://schemas.openxmlformats.org/drawingml/2006/main" xmlns:r="http://schemas.openxmlformats.org/officeDocument/2006/relationships" xmlns:p="http://schemas.openxmlformats.org/presentationml/2006/main">
+  <p:cSld>
+    <p:spTree>
+      <p:nvGrpSpPr>
+        <p:cNvPr id="1" name=""/>
+        <p:cNvGrpSpPr/>
+        <p:nvPr/>
+      </p:nvGrpSpPr>
+      <p:grpSpPr>
+        <a:xfrm>
+          <a:off x="0" y="0"/>
+          <a:ext cx="0" cy="0"/>
+          <a:chOff x="0" y="0"/>
+          <a:chExt cx="0" cy="0"/>
+        </a:xfrm>
+      </p:grpSpPr>
+      <p:sp>
+        <p:nvSpPr>
+          <p:cNvPr id="2" name="Заголовок 1"/>
+          <p:cNvSpPr>
+            <a:spLocks noGrp="1"/>
+          </p:cNvSpPr>
+          <p:nvPr>
+            <p:ph type="title"/>
+          </p:nvPr>
+        </p:nvSpPr>
+        <p:spPr/>
+        <p:txBody>
+          <a:bodyPr/>
+          <a:lstStyle/>
+          <a:p>
+            <a:r>
+              <a:rPr lang="ru-RU" dirty="0" smtClean="0"/>
+              <a:t>пример</a:t>
+            </a:r>
+            <a:endParaRPr lang="ru-RU" dirty="0"/>
+          </a:p>
+        </p:txBody>
+      </p:sp>
+      <p:sp>
+        <p:nvSpPr>
+          <p:cNvPr id="3" name="Содержимое 2"/>
+          <p:cNvSpPr>
+            <a:spLocks noGrp="1"/>
+          </p:cNvSpPr>
+          <p:nvPr>
+            <p:ph idx="1"/>
+          </p:nvPr>
+        </p:nvSpPr>
+        <p:spPr/>
+        <p:txBody>
+          <a:bodyPr/>
+          <a:lstStyle/>
+          <a:p>
+            <a:pPr>
+              <a:buNone/>
+            </a:pPr>
+            <a:r>
+              <a:rPr lang="ru-RU" dirty="0" smtClean="0"/>
+              <a:t>Рассмотрим отношение </a:t>
+            </a:r>
+            <a:r>
+              <a:rPr lang="en-US" dirty="0" smtClean="0"/>
+              <a:t>R(A,B,C,D,E) </a:t>
+            </a:r>
+            <a:r>
+              <a:rPr lang="ru-RU" dirty="0" smtClean="0"/>
+              <a:t>и множество функциональных зависимостей </a:t>
+            </a:r>
+            <a:r>
+              <a:rPr lang="en-US" dirty="0" smtClean="0"/>
+              <a:t>S1 = {AB</a:t>
+            </a:r>
+            <a:r>
+              <a:rPr lang="en-US" dirty="0" smtClean="0"/>
+              <a:t> </a:t>
+            </a:r>
+            <a:r>
+              <a:rPr lang="en-US" dirty="0" smtClean="0"/>
+              <a:t>→ C, AE</a:t>
+            </a:r>
+            <a:r>
+              <a:rPr lang="en-US" dirty="0" smtClean="0"/>
+              <a:t> </a:t>
+            </a:r>
+            <a:r>
+              <a:rPr lang="en-US" dirty="0" smtClean="0"/>
+              <a:t>→ D, D</a:t>
+            </a:r>
+            <a:r>
+              <a:rPr lang="en-US" dirty="0" smtClean="0"/>
+              <a:t> </a:t>
+            </a:r>
+            <a:r>
+              <a:rPr lang="en-US" dirty="0" smtClean="0"/>
+              <a:t>→ B}</a:t>
+            </a:r>
+          </a:p>
+          <a:p>
+            <a:pPr>
+              <a:buNone/>
+            </a:pPr>
+            <a:endParaRPr lang="en-US" dirty="0" smtClean="0"/>
+          </a:p>
+          <a:p>
+            <a:pPr>
+              <a:buNone/>
+            </a:pPr>
+            <a:r>
+              <a:rPr lang="ru-RU" dirty="0" smtClean="0"/>
+              <a:t>Какие из следующих наборов функциональных зависимостей НЕ следуют из </a:t>
+            </a:r>
+            <a:r>
+              <a:rPr lang="en-US" dirty="0" smtClean="0"/>
+              <a:t>S1?</a:t>
+            </a:r>
+          </a:p>
+          <a:p>
+            <a:pPr>
+              <a:buNone/>
+            </a:pPr>
+            <a:r>
+              <a:rPr lang="en-US" dirty="0" smtClean="0"/>
+              <a:t>	</a:t>
+            </a:r>
+            <a:r>
+              <a:rPr lang="en-US" dirty="0" smtClean="0"/>
+              <a:t>{AD</a:t>
+            </a:r>
+            <a:r>
+              <a:rPr lang="en-US" dirty="0" smtClean="0"/>
+              <a:t> </a:t>
+            </a:r>
+            <a:r>
+              <a:rPr lang="en-US" dirty="0" smtClean="0"/>
+              <a:t>→ C}</a:t>
+            </a:r>
+          </a:p>
+          <a:p>
+            <a:pPr>
+              <a:buNone/>
+            </a:pPr>
+            <a:r>
+              <a:rPr lang="en-US" dirty="0" smtClean="0"/>
+              <a:t>	</a:t>
+            </a:r>
+            <a:r>
+              <a:rPr lang="en-US" dirty="0" smtClean="0"/>
+              <a:t>{AD</a:t>
+            </a:r>
+            <a:r>
+              <a:rPr lang="en-US" dirty="0" smtClean="0"/>
+              <a:t> </a:t>
+            </a:r>
+            <a:r>
+              <a:rPr lang="en-US" dirty="0" smtClean="0"/>
+              <a:t>→ C, AE</a:t>
+            </a:r>
+            <a:r>
+              <a:rPr lang="en-US" dirty="0" smtClean="0"/>
+              <a:t> </a:t>
+            </a:r>
+            <a:r>
+              <a:rPr lang="en-US" dirty="0" smtClean="0"/>
+              <a:t>→ B}</a:t>
+            </a:r>
+          </a:p>
+          <a:p>
+            <a:pPr>
+              <a:buNone/>
+            </a:pPr>
+            <a:r>
+              <a:rPr lang="en-US" dirty="0" smtClean="0"/>
+              <a:t>	</a:t>
+            </a:r>
+            <a:r>
+              <a:rPr lang="en-US" dirty="0" smtClean="0"/>
+              <a:t>{ABC</a:t>
+            </a:r>
+            <a:r>
+              <a:rPr lang="en-US" dirty="0" smtClean="0"/>
+              <a:t> </a:t>
+            </a:r>
+            <a:r>
+              <a:rPr lang="en-US" dirty="0" smtClean="0"/>
+              <a:t>→ D, D</a:t>
+            </a:r>
+            <a:r>
+              <a:rPr lang="en-US" dirty="0" smtClean="0"/>
+              <a:t> </a:t>
+            </a:r>
+            <a:r>
+              <a:rPr lang="en-US" dirty="0" smtClean="0"/>
+              <a:t>→ B}</a:t>
+            </a:r>
+          </a:p>
+          <a:p>
+            <a:pPr>
+              <a:buNone/>
+            </a:pPr>
+            <a:r>
+              <a:rPr lang="en-US" dirty="0" smtClean="0"/>
+              <a:t>	</a:t>
+            </a:r>
+            <a:r>
+              <a:rPr lang="en-US" dirty="0" smtClean="0"/>
+              <a:t>{ADE</a:t>
+            </a:r>
+            <a:r>
+              <a:rPr lang="en-US" dirty="0" smtClean="0"/>
+              <a:t> </a:t>
+            </a:r>
+            <a:r>
+              <a:rPr lang="en-US" dirty="0" smtClean="0"/>
+              <a:t>→ BC}</a:t>
+            </a:r>
+            <a:endParaRPr lang="ru-RU" dirty="0"/>
           </a:p>
         </p:txBody>
       </p:sp>
@@ -6745,7 +9284,7 @@
     </p:spTree>
     <p:extLst>
       <p:ext uri="{BB962C8B-B14F-4D97-AF65-F5344CB8AC3E}">
-        <p14:creationId xmlns:p14="http://schemas.microsoft.com/office/powerpoint/2010/main" val="4070160868"/>
+        <p14:creationId xmlns:p14="http://schemas.microsoft.com/office/powerpoint/2010/main" xmlns="" val="4070160868"/>
       </p:ext>
     </p:extLst>
   </p:cSld>
@@ -6962,7 +9501,7 @@
     </p:spTree>
     <p:extLst>
       <p:ext uri="{BB962C8B-B14F-4D97-AF65-F5344CB8AC3E}">
-        <p14:creationId xmlns:p14="http://schemas.microsoft.com/office/powerpoint/2010/main" val="2057698821"/>
+        <p14:creationId xmlns:p14="http://schemas.microsoft.com/office/powerpoint/2010/main" xmlns="" val="2057698821"/>
       </p:ext>
     </p:extLst>
   </p:cSld>
@@ -7099,7 +9638,7 @@
     </p:spTree>
     <p:extLst>
       <p:ext uri="{BB962C8B-B14F-4D97-AF65-F5344CB8AC3E}">
-        <p14:creationId xmlns:p14="http://schemas.microsoft.com/office/powerpoint/2010/main" val="753759385"/>
+        <p14:creationId xmlns:p14="http://schemas.microsoft.com/office/powerpoint/2010/main" xmlns="" val="753759385"/>
       </p:ext>
     </p:extLst>
   </p:cSld>
@@ -7278,7 +9817,7 @@
     </p:spTree>
     <p:extLst>
       <p:ext uri="{BB962C8B-B14F-4D97-AF65-F5344CB8AC3E}">
-        <p14:creationId xmlns:p14="http://schemas.microsoft.com/office/powerpoint/2010/main" val="3905832796"/>
+        <p14:creationId xmlns:p14="http://schemas.microsoft.com/office/powerpoint/2010/main" xmlns="" val="3905832796"/>
       </p:ext>
     </p:extLst>
   </p:cSld>
@@ -7345,7 +9884,7 @@
             <p:ph idx="1"/>
             <p:extLst>
               <p:ext uri="{D42A27DB-BD31-4B8C-83A1-F6EECF244321}">
-                <p14:modId xmlns:p14="http://schemas.microsoft.com/office/powerpoint/2010/main" val="3632354975"/>
+                <p14:modId xmlns:p14="http://schemas.microsoft.com/office/powerpoint/2010/main" xmlns="" val="3632354975"/>
               </p:ext>
             </p:extLst>
           </p:nvPr>
@@ -7627,7 +10166,7 @@
     </p:spTree>
     <p:extLst>
       <p:ext uri="{BB962C8B-B14F-4D97-AF65-F5344CB8AC3E}">
-        <p14:creationId xmlns:p14="http://schemas.microsoft.com/office/powerpoint/2010/main" val="2873922950"/>
+        <p14:creationId xmlns:p14="http://schemas.microsoft.com/office/powerpoint/2010/main" xmlns="" val="2873922950"/>
       </p:ext>
     </p:extLst>
   </p:cSld>
@@ -7717,7 +10256,15 @@
             </a:pPr>
             <a:r>
               <a:rPr lang="en-US" dirty="0" smtClean="0"/>
-              <a:t>A,B -&gt; C</a:t>
+              <a:t>A,B </a:t>
+            </a:r>
+            <a:r>
+              <a:rPr lang="en-US" dirty="0" smtClean="0"/>
+              <a:t>→ </a:t>
+            </a:r>
+            <a:r>
+              <a:rPr lang="en-US" dirty="0" smtClean="0"/>
+              <a:t>C</a:t>
             </a:r>
           </a:p>
           <a:p>
@@ -7726,7 +10273,15 @@
             </a:pPr>
             <a:r>
               <a:rPr lang="en-US" dirty="0" smtClean="0"/>
-              <a:t>C,D -&gt;E</a:t>
+              <a:t>C,D </a:t>
+            </a:r>
+            <a:r>
+              <a:rPr lang="en-US" dirty="0" smtClean="0"/>
+              <a:t>→ </a:t>
+            </a:r>
+            <a:r>
+              <a:rPr lang="en-US" dirty="0" smtClean="0"/>
+              <a:t>E</a:t>
             </a:r>
             <a:endParaRPr lang="ru-RU" dirty="0" smtClean="0"/>
           </a:p>
@@ -7771,9 +10326,277 @@
     </p:spTree>
     <p:extLst>
       <p:ext uri="{BB962C8B-B14F-4D97-AF65-F5344CB8AC3E}">
-        <p14:creationId xmlns:p14="http://schemas.microsoft.com/office/powerpoint/2010/main" val="2085872777"/>
+        <p14:creationId xmlns:p14="http://schemas.microsoft.com/office/powerpoint/2010/main" xmlns="" val="2085872777"/>
       </p:ext>
     </p:extLst>
+  </p:cSld>
+  <p:clrMapOvr>
+    <a:masterClrMapping/>
+  </p:clrMapOvr>
+  <p:timing>
+    <p:tnLst>
+      <p:par>
+        <p:cTn id="1" dur="indefinite" restart="never" nodeType="tmRoot"/>
+      </p:par>
+    </p:tnLst>
+  </p:timing>
+</p:sld>
+</file>
+
+<file path=ppt/slides/slide9.xml><?xml version="1.0" encoding="utf-8"?>
+<p:sld xmlns:a="http://schemas.openxmlformats.org/drawingml/2006/main" xmlns:r="http://schemas.openxmlformats.org/officeDocument/2006/relationships" xmlns:p="http://schemas.openxmlformats.org/presentationml/2006/main">
+  <p:cSld>
+    <p:spTree>
+      <p:nvGrpSpPr>
+        <p:cNvPr id="1" name=""/>
+        <p:cNvGrpSpPr/>
+        <p:nvPr/>
+      </p:nvGrpSpPr>
+      <p:grpSpPr>
+        <a:xfrm>
+          <a:off x="0" y="0"/>
+          <a:ext cx="0" cy="0"/>
+          <a:chOff x="0" y="0"/>
+          <a:chExt cx="0" cy="0"/>
+        </a:xfrm>
+      </p:grpSpPr>
+      <p:sp>
+        <p:nvSpPr>
+          <p:cNvPr id="2" name="Заголовок 1"/>
+          <p:cNvSpPr>
+            <a:spLocks noGrp="1"/>
+          </p:cNvSpPr>
+          <p:nvPr>
+            <p:ph type="title"/>
+          </p:nvPr>
+        </p:nvSpPr>
+        <p:spPr/>
+        <p:txBody>
+          <a:bodyPr/>
+          <a:lstStyle/>
+          <a:p>
+            <a:r>
+              <a:rPr lang="ru-RU" dirty="0" smtClean="0"/>
+              <a:t>Пример</a:t>
+            </a:r>
+            <a:endParaRPr lang="ru-RU" dirty="0"/>
+          </a:p>
+        </p:txBody>
+      </p:sp>
+      <p:sp>
+        <p:nvSpPr>
+          <p:cNvPr id="3" name="Содержимое 2"/>
+          <p:cNvSpPr>
+            <a:spLocks noGrp="1"/>
+          </p:cNvSpPr>
+          <p:nvPr>
+            <p:ph idx="1"/>
+          </p:nvPr>
+        </p:nvSpPr>
+        <p:spPr/>
+        <p:txBody>
+          <a:bodyPr/>
+          <a:lstStyle/>
+          <a:p>
+            <a:pPr>
+              <a:buNone/>
+            </a:pPr>
+            <a:r>
+              <a:rPr lang="en-US" dirty="0" smtClean="0"/>
+              <a:t>Student(</a:t>
+            </a:r>
+            <a:r>
+              <a:rPr lang="en-US" dirty="0" err="1" smtClean="0"/>
+              <a:t>passID</a:t>
+            </a:r>
+            <a:r>
+              <a:rPr lang="en-US" dirty="0" smtClean="0"/>
+              <a:t>, </a:t>
+            </a:r>
+            <a:r>
+              <a:rPr lang="en-US" dirty="0" err="1" smtClean="0"/>
+              <a:t>sName</a:t>
+            </a:r>
+            <a:r>
+              <a:rPr lang="en-US" dirty="0" smtClean="0"/>
+              <a:t>, address, </a:t>
+            </a:r>
+            <a:r>
+              <a:rPr lang="en-US" dirty="0" err="1" smtClean="0"/>
+              <a:t>HScode</a:t>
+            </a:r>
+            <a:r>
+              <a:rPr lang="en-US" dirty="0" smtClean="0"/>
+              <a:t>, </a:t>
+            </a:r>
+            <a:r>
+              <a:rPr lang="en-US" dirty="0" err="1" smtClean="0"/>
+              <a:t>HSname</a:t>
+            </a:r>
+            <a:r>
+              <a:rPr lang="en-US" dirty="0" smtClean="0"/>
+              <a:t>, </a:t>
+            </a:r>
+            <a:r>
+              <a:rPr lang="en-US" dirty="0" err="1" smtClean="0"/>
+              <a:t>HScity</a:t>
+            </a:r>
+            <a:r>
+              <a:rPr lang="en-US" dirty="0" smtClean="0"/>
+              <a:t>, GPA, priority)</a:t>
+            </a:r>
+          </a:p>
+          <a:p>
+            <a:pPr>
+              <a:buNone/>
+            </a:pPr>
+            <a:r>
+              <a:rPr lang="en-US" dirty="0" err="1" smtClean="0"/>
+              <a:t>passID</a:t>
+            </a:r>
+            <a:r>
+              <a:rPr lang="en-US" dirty="0" smtClean="0"/>
+              <a:t> → </a:t>
+            </a:r>
+            <a:r>
+              <a:rPr lang="en-US" dirty="0" err="1" smtClean="0"/>
+              <a:t>sName</a:t>
+            </a:r>
+            <a:endParaRPr lang="en-US" dirty="0" smtClean="0"/>
+          </a:p>
+          <a:p>
+            <a:pPr>
+              <a:buNone/>
+            </a:pPr>
+            <a:r>
+              <a:rPr lang="en-US" dirty="0" err="1" smtClean="0"/>
+              <a:t>passID</a:t>
+            </a:r>
+            <a:r>
+              <a:rPr lang="en-US" dirty="0" smtClean="0"/>
+              <a:t> → address</a:t>
+            </a:r>
+          </a:p>
+          <a:p>
+            <a:pPr>
+              <a:buNone/>
+            </a:pPr>
+            <a:r>
+              <a:rPr lang="en-US" dirty="0" err="1" smtClean="0"/>
+              <a:t>HScode</a:t>
+            </a:r>
+            <a:r>
+              <a:rPr lang="en-US" dirty="0" smtClean="0"/>
+              <a:t> </a:t>
+            </a:r>
+            <a:r>
+              <a:rPr lang="en-US" dirty="0" smtClean="0"/>
+              <a:t>→ </a:t>
+            </a:r>
+            <a:r>
+              <a:rPr lang="en-US" dirty="0" err="1" smtClean="0"/>
+              <a:t>HSname</a:t>
+            </a:r>
+            <a:r>
+              <a:rPr lang="en-US" dirty="0" smtClean="0"/>
+              <a:t>, </a:t>
+            </a:r>
+            <a:r>
+              <a:rPr lang="en-US" dirty="0" err="1" smtClean="0"/>
+              <a:t>HScity</a:t>
+            </a:r>
+            <a:endParaRPr lang="en-US" dirty="0" smtClean="0"/>
+          </a:p>
+          <a:p>
+            <a:pPr>
+              <a:buNone/>
+            </a:pPr>
+            <a:r>
+              <a:rPr lang="en-US" dirty="0" err="1" smtClean="0"/>
+              <a:t>HSname</a:t>
+            </a:r>
+            <a:r>
+              <a:rPr lang="en-US" dirty="0" smtClean="0"/>
+              <a:t> ,</a:t>
+            </a:r>
+            <a:r>
+              <a:rPr lang="en-US" dirty="0" smtClean="0"/>
+              <a:t> </a:t>
+            </a:r>
+            <a:r>
+              <a:rPr lang="en-US" dirty="0" err="1" smtClean="0"/>
+              <a:t>HScity</a:t>
+            </a:r>
+            <a:r>
+              <a:rPr lang="en-US" dirty="0" smtClean="0"/>
+              <a:t> </a:t>
+            </a:r>
+            <a:r>
+              <a:rPr lang="en-US" dirty="0" smtClean="0"/>
+              <a:t>→ </a:t>
+            </a:r>
+            <a:r>
+              <a:rPr lang="en-US" dirty="0" err="1" smtClean="0"/>
+              <a:t>HScode</a:t>
+            </a:r>
+            <a:endParaRPr lang="en-US" dirty="0" smtClean="0"/>
+          </a:p>
+          <a:p>
+            <a:pPr>
+              <a:buNone/>
+            </a:pPr>
+            <a:endParaRPr lang="en-US" dirty="0" smtClean="0"/>
+          </a:p>
+          <a:p>
+            <a:pPr>
+              <a:buNone/>
+            </a:pPr>
+            <a:r>
+              <a:rPr lang="en-US" dirty="0" err="1" smtClean="0"/>
+              <a:t>passID</a:t>
+            </a:r>
+            <a:r>
+              <a:rPr lang="en-US" dirty="0" smtClean="0"/>
+              <a:t> → GPA</a:t>
+            </a:r>
+          </a:p>
+          <a:p>
+            <a:pPr>
+              <a:buNone/>
+            </a:pPr>
+            <a:r>
+              <a:rPr lang="en-US" dirty="0" smtClean="0"/>
+              <a:t>GPA</a:t>
+            </a:r>
+            <a:r>
+              <a:rPr lang="en-US" dirty="0" smtClean="0"/>
+              <a:t> </a:t>
+            </a:r>
+            <a:r>
+              <a:rPr lang="en-US" dirty="0" smtClean="0"/>
+              <a:t>→ priority</a:t>
+            </a:r>
+          </a:p>
+          <a:p>
+            <a:pPr>
+              <a:buNone/>
+            </a:pPr>
+            <a:r>
+              <a:rPr lang="en-US" dirty="0" smtClean="0"/>
+              <a:t>	=&gt; </a:t>
+            </a:r>
+            <a:r>
+              <a:rPr lang="en-US" dirty="0" err="1" smtClean="0"/>
+              <a:t>passID</a:t>
+            </a:r>
+            <a:r>
+              <a:rPr lang="en-US" dirty="0" smtClean="0"/>
+              <a:t> → priority</a:t>
+            </a:r>
+          </a:p>
+        </p:txBody>
+      </p:sp>
+    </p:spTree>
   </p:cSld>
   <p:clrMapOvr>
     <a:masterClrMapping/>
@@ -8038,7 +10861,7 @@
   <a:extraClrSchemeLst/>
   <a:extLst>
     <a:ext uri="{05A4C25C-085E-4340-85A3-A5531E510DB2}">
-      <thm15:themeFamily xmlns:thm15="http://schemas.microsoft.com/office/thememl/2012/main" name="Mesh" id="{789EC3FE-34FD-429C-9918-760025E6C145}" vid="{B8BE45C0-8141-4D58-8C71-A009BC26FBBB}"/>
+      <thm15:themeFamily xmlns:thm15="http://schemas.microsoft.com/office/thememl/2012/main" xmlns="" name="Mesh" id="{789EC3FE-34FD-429C-9918-760025E6C145}" vid="{B8BE45C0-8141-4D58-8C71-A009BC26FBBB}"/>
     </a:ext>
   </a:extLst>
 </a:theme>
@@ -8299,7 +11122,7 @@
   <a:extraClrSchemeLst/>
   <a:extLst>
     <a:ext uri="{05A4C25C-085E-4340-85A3-A5531E510DB2}">
-      <thm15:themeFamily xmlns:thm15="http://schemas.microsoft.com/office/thememl/2012/main" name="Office Theme" id="{62F939B6-93AF-4DB8-9C6B-D6C7DFDC589F}" vid="{4A3C46E8-61CC-4603-A589-7422A47A8E4A}"/>
+      <thm15:themeFamily xmlns:thm15="http://schemas.microsoft.com/office/thememl/2012/main" xmlns="" name="Office Theme" id="{62F939B6-93AF-4DB8-9C6B-D6C7DFDC589F}" vid="{4A3C46E8-61CC-4603-A589-7422A47A8E4A}"/>
     </a:ext>
   </a:extLst>
 </a:theme>

</xml_diff>